<commit_message>
updated ppt text & graphics
updated ppt text & graphics
</commit_message>
<xml_diff>
--- a/Financial Data Analysis.pptx
+++ b/Financial Data Analysis.pptx
@@ -885,10 +885,9 @@
         <a:lstStyle/>
         <a:p>
           <a:r>
-            <a:rPr lang="en-US" dirty="0" smtClean="0"/>
+            <a:rPr lang="en-US" dirty="0"/>
             <a:t>Calculate weekly averages</a:t>
           </a:r>
-          <a:endParaRPr lang="en-US" dirty="0"/>
         </a:p>
       </dgm:t>
     </dgm:pt>
@@ -922,10 +921,9 @@
         <a:lstStyle/>
         <a:p>
           <a:r>
-            <a:rPr lang="en-US" dirty="0" smtClean="0"/>
+            <a:rPr lang="en-US" dirty="0"/>
             <a:t>Explore</a:t>
           </a:r>
-          <a:endParaRPr lang="en-US" dirty="0"/>
         </a:p>
       </dgm:t>
     </dgm:pt>
@@ -959,10 +957,9 @@
         <a:lstStyle/>
         <a:p>
           <a:r>
-            <a:rPr lang="en-US" dirty="0" smtClean="0"/>
+            <a:rPr lang="en-US" dirty="0"/>
             <a:t>Prediction</a:t>
           </a:r>
-          <a:endParaRPr lang="en-US" dirty="0"/>
         </a:p>
       </dgm:t>
     </dgm:pt>
@@ -996,10 +993,9 @@
         <a:lstStyle/>
         <a:p>
           <a:r>
-            <a:rPr lang="en-US" dirty="0" smtClean="0"/>
+            <a:rPr lang="en-US" dirty="0"/>
             <a:t>Google Trends</a:t>
           </a:r>
-          <a:endParaRPr lang="en-US" dirty="0"/>
         </a:p>
       </dgm:t>
     </dgm:pt>
@@ -1033,10 +1029,9 @@
         <a:lstStyle/>
         <a:p>
           <a:r>
-            <a:rPr lang="en-US" dirty="0" smtClean="0"/>
+            <a:rPr lang="en-US" dirty="0"/>
             <a:t>Yahoo Finance</a:t>
           </a:r>
-          <a:endParaRPr lang="en-US" dirty="0"/>
         </a:p>
       </dgm:t>
     </dgm:pt>
@@ -1070,10 +1065,9 @@
         <a:lstStyle/>
         <a:p>
           <a:r>
-            <a:rPr lang="en-US" dirty="0" smtClean="0"/>
+            <a:rPr lang="en-US" dirty="0"/>
             <a:t>Obtain Data</a:t>
           </a:r>
-          <a:endParaRPr lang="en-US" dirty="0"/>
         </a:p>
       </dgm:t>
     </dgm:pt>
@@ -1107,10 +1101,9 @@
         <a:lstStyle/>
         <a:p>
           <a:r>
-            <a:rPr lang="en-US" dirty="0" smtClean="0"/>
+            <a:rPr lang="en-US" dirty="0"/>
             <a:t>Manipulate</a:t>
           </a:r>
-          <a:endParaRPr lang="en-US" dirty="0"/>
         </a:p>
       </dgm:t>
     </dgm:pt>
@@ -1144,10 +1137,9 @@
         <a:lstStyle/>
         <a:p>
           <a:r>
-            <a:rPr lang="en-US" dirty="0" smtClean="0"/>
+            <a:rPr lang="en-US" dirty="0"/>
             <a:t>Correlation between stock price &amp; search results</a:t>
           </a:r>
-          <a:endParaRPr lang="en-US" dirty="0"/>
         </a:p>
       </dgm:t>
     </dgm:pt>
@@ -1181,10 +1173,9 @@
         <a:lstStyle/>
         <a:p>
           <a:r>
-            <a:rPr lang="en-US" dirty="0" smtClean="0"/>
+            <a:rPr lang="en-US" dirty="0"/>
             <a:t>Determine optimal lags</a:t>
           </a:r>
-          <a:endParaRPr lang="en-US" dirty="0"/>
         </a:p>
       </dgm:t>
     </dgm:pt>
@@ -1218,10 +1209,9 @@
         <a:lstStyle/>
         <a:p>
           <a:r>
-            <a:rPr lang="en-US" dirty="0" smtClean="0"/>
+            <a:rPr lang="en-US" dirty="0"/>
             <a:t>Account for holidays</a:t>
           </a:r>
-          <a:endParaRPr lang="en-US" dirty="0"/>
         </a:p>
       </dgm:t>
     </dgm:pt>
@@ -1237,6 +1227,111 @@
       </dgm:t>
     </dgm:pt>
     <dgm:pt modelId="{81A8D28F-CAF0-4363-9091-571FC59AEE81}" type="sibTrans" cxnId="{AECEF381-77E9-4C27-B444-DD5842F04484}">
+      <dgm:prSet/>
+      <dgm:spPr/>
+      <dgm:t>
+        <a:bodyPr/>
+        <a:lstStyle/>
+        <a:p>
+          <a:endParaRPr lang="en-US"/>
+        </a:p>
+      </dgm:t>
+    </dgm:pt>
+    <dgm:pt modelId="{F7F84BDD-D210-4888-985E-B931BE8B599F}">
+      <dgm:prSet phldrT="[Text]"/>
+      <dgm:spPr/>
+      <dgm:t>
+        <a:bodyPr/>
+        <a:lstStyle/>
+        <a:p>
+          <a:r>
+            <a:rPr lang="en-US" dirty="0"/>
+            <a:t>Calculate returns</a:t>
+          </a:r>
+        </a:p>
+      </dgm:t>
+    </dgm:pt>
+    <dgm:pt modelId="{54F0CF01-D8DD-4A6B-9C60-FCC01C163D1F}" type="parTrans" cxnId="{DCE4BEFB-D577-417E-BF8A-70F14231060E}">
+      <dgm:prSet/>
+      <dgm:spPr/>
+      <dgm:t>
+        <a:bodyPr/>
+        <a:lstStyle/>
+        <a:p>
+          <a:endParaRPr lang="en-US"/>
+        </a:p>
+      </dgm:t>
+    </dgm:pt>
+    <dgm:pt modelId="{5F0A60DE-26E2-4E29-ACC9-81B8AA6DD4C7}" type="sibTrans" cxnId="{DCE4BEFB-D577-417E-BF8A-70F14231060E}">
+      <dgm:prSet/>
+      <dgm:spPr/>
+      <dgm:t>
+        <a:bodyPr/>
+        <a:lstStyle/>
+        <a:p>
+          <a:endParaRPr lang="en-US"/>
+        </a:p>
+      </dgm:t>
+    </dgm:pt>
+    <dgm:pt modelId="{C0C892C4-E63A-4CF4-B102-EB7714676B47}">
+      <dgm:prSet phldrT="[Text]"/>
+      <dgm:spPr/>
+      <dgm:t>
+        <a:bodyPr/>
+        <a:lstStyle/>
+        <a:p>
+          <a:r>
+            <a:rPr lang="en-US" dirty="0"/>
+            <a:t>Identify weeks with greatest losses</a:t>
+          </a:r>
+        </a:p>
+      </dgm:t>
+    </dgm:pt>
+    <dgm:pt modelId="{4EEC3343-245D-41C8-A573-3CA06FD92081}" type="parTrans" cxnId="{7DD2B586-B179-411A-8919-E494623775E5}">
+      <dgm:prSet/>
+      <dgm:spPr/>
+      <dgm:t>
+        <a:bodyPr/>
+        <a:lstStyle/>
+        <a:p>
+          <a:endParaRPr lang="en-US"/>
+        </a:p>
+      </dgm:t>
+    </dgm:pt>
+    <dgm:pt modelId="{6D7B9D93-213C-4CE0-B2BB-D1E59F90EDD4}" type="sibTrans" cxnId="{7DD2B586-B179-411A-8919-E494623775E5}">
+      <dgm:prSet/>
+      <dgm:spPr/>
+      <dgm:t>
+        <a:bodyPr/>
+        <a:lstStyle/>
+        <a:p>
+          <a:endParaRPr lang="en-US"/>
+        </a:p>
+      </dgm:t>
+    </dgm:pt>
+    <dgm:pt modelId="{3EE3A445-652B-425B-BB7E-DE19712B873C}">
+      <dgm:prSet phldrT="[Text]"/>
+      <dgm:spPr/>
+      <dgm:t>
+        <a:bodyPr/>
+        <a:lstStyle/>
+        <a:p>
+          <a:endParaRPr lang="en-US" dirty="0"/>
+        </a:p>
+      </dgm:t>
+    </dgm:pt>
+    <dgm:pt modelId="{720A59EE-F0EF-480F-AD22-CD8BB9007034}" type="parTrans" cxnId="{118C9EF4-F276-41B2-AC90-A7B723AE71C9}">
+      <dgm:prSet/>
+      <dgm:spPr/>
+      <dgm:t>
+        <a:bodyPr/>
+        <a:lstStyle/>
+        <a:p>
+          <a:endParaRPr lang="en-US"/>
+        </a:p>
+      </dgm:t>
+    </dgm:pt>
+    <dgm:pt modelId="{7619B03D-FEF4-44F3-ADD8-5746F3544BD0}" type="sibTrans" cxnId="{118C9EF4-F276-41B2-AC90-A7B723AE71C9}">
       <dgm:prSet/>
       <dgm:spPr/>
       <dgm:t>
@@ -1316,13 +1411,6 @@
         </dgm:presLayoutVars>
       </dgm:prSet>
       <dgm:spPr/>
-      <dgm:t>
-        <a:bodyPr/>
-        <a:lstStyle/>
-        <a:p>
-          <a:endParaRPr lang="en-US"/>
-        </a:p>
-      </dgm:t>
     </dgm:pt>
     <dgm:pt modelId="{76C19E85-E0EF-4792-A9BD-34B0E0AB515F}" type="pres">
       <dgm:prSet presAssocID="{31DA040D-4AE9-4F07-9B59-0535216902AF}" presName="sibTrans" presStyleLbl="sibTrans2D1" presStyleIdx="1" presStyleCnt="3"/>
@@ -1357,13 +1445,6 @@
         </dgm:presLayoutVars>
       </dgm:prSet>
       <dgm:spPr/>
-      <dgm:t>
-        <a:bodyPr/>
-        <a:lstStyle/>
-        <a:p>
-          <a:endParaRPr lang="en-US"/>
-        </a:p>
-      </dgm:t>
     </dgm:pt>
     <dgm:pt modelId="{91F87420-E9EE-4440-B2D6-E4D049468E71}" type="pres">
       <dgm:prSet presAssocID="{A7358417-CF10-478E-BD2A-5D77E2E3DCF4}" presName="sibTrans" presStyleLbl="sibTrans2D1" presStyleIdx="2" presStyleCnt="3"/>
@@ -1401,37 +1482,43 @@
     </dgm:pt>
   </dgm:ptLst>
   <dgm:cxnLst>
-    <dgm:cxn modelId="{4B9E57EC-30F0-4E88-B134-D0565F81EBD7}" type="presOf" srcId="{DE2D4699-6F9D-42B3-87EC-A357A57566CD}" destId="{0A05BB02-13B0-40F9-8B57-65152B0FB439}" srcOrd="0" destOrd="0" presId="urn:microsoft.com/office/officeart/2005/8/layout/process3"/>
-    <dgm:cxn modelId="{4DB04A85-4943-4B57-B7B2-4FC9B40F30DC}" type="presOf" srcId="{909389E1-1BE9-44A2-93C0-088EB88E0FD5}" destId="{8BFDD63F-4409-42BE-AFA9-DA5674CCA82A}" srcOrd="0" destOrd="0" presId="urn:microsoft.com/office/officeart/2005/8/layout/process3"/>
-    <dgm:cxn modelId="{361651F6-B502-4C90-AE59-D1692080FC51}" type="presOf" srcId="{CFB111AD-D60C-4179-A508-526A3292D9A7}" destId="{35EF949C-AC59-41B1-9F03-BA20A3B1BB48}" srcOrd="0" destOrd="0" presId="urn:microsoft.com/office/officeart/2005/8/layout/process3"/>
-    <dgm:cxn modelId="{BD4E5240-1543-48D3-84C3-45EAE6C17C6E}" type="presOf" srcId="{188AA136-94BE-4647-8C67-3E0F99953608}" destId="{10A1F8E8-AE67-473C-9E01-C525D133753A}" srcOrd="0" destOrd="0" presId="urn:microsoft.com/office/officeart/2005/8/layout/process3"/>
-    <dgm:cxn modelId="{7C82E2F5-0559-4B4E-A9FD-795EA1A51DED}" type="presOf" srcId="{0ADC1D22-DB74-4A5A-A947-3050E9608AC9}" destId="{B59A95E1-F890-4441-B6A7-E562DEFE1C5F}" srcOrd="0" destOrd="1" presId="urn:microsoft.com/office/officeart/2005/8/layout/process3"/>
-    <dgm:cxn modelId="{A4D85858-56B9-4BE4-8B31-9F4C735D9FC4}" type="presOf" srcId="{ED30401C-734E-48E5-A434-7B9620412364}" destId="{BC70D6B9-2A9D-48E9-80DA-B14C59660136}" srcOrd="0" destOrd="0" presId="urn:microsoft.com/office/officeart/2005/8/layout/process3"/>
-    <dgm:cxn modelId="{43FB1C1F-6A3E-4229-96AD-7D25EE11A4A8}" srcId="{ED30401C-734E-48E5-A434-7B9620412364}" destId="{DE2D4699-6F9D-42B3-87EC-A357A57566CD}" srcOrd="0" destOrd="0" parTransId="{04442720-B6AD-440F-AF4E-227A5116DBEA}" sibTransId="{61DB6E9B-7F62-4BAC-9662-926C00658932}"/>
-    <dgm:cxn modelId="{8240DE41-3A26-4A5A-B104-0D10A5F70A21}" srcId="{C5BD7796-FABB-4CA7-9571-FDE5CB30A979}" destId="{FAE59212-B71D-49CD-9B7B-AA8BE0B7918E}" srcOrd="2" destOrd="0" parTransId="{641C9468-CB89-4748-BD0C-E0C1EDDA898F}" sibTransId="{A7358417-CF10-478E-BD2A-5D77E2E3DCF4}"/>
-    <dgm:cxn modelId="{4238D8F9-6F2D-45C9-88A5-5EA43CE9E321}" type="presOf" srcId="{6209FE2A-9EDD-471E-AF57-4211626FC7CE}" destId="{51D81FF2-2E78-4FDC-914B-18FC7DAC01F5}" srcOrd="0" destOrd="0" presId="urn:microsoft.com/office/officeart/2005/8/layout/process3"/>
-    <dgm:cxn modelId="{5A5B2770-2B5F-4399-9DFE-2E97E4C4599F}" srcId="{8C05E1F9-B9EC-4103-9066-F9C00B692045}" destId="{6F90A93B-F7CC-42B6-8981-1ED37DB38E8D}" srcOrd="0" destOrd="0" parTransId="{7619CA39-ACD3-4B29-B150-529826EFBBA4}" sibTransId="{4A667A21-AE1E-4F47-B209-B343589D8E32}"/>
+    <dgm:cxn modelId="{EEF58507-5FDE-4AC5-9B4E-2D2F41F11658}" type="presOf" srcId="{A7358417-CF10-478E-BD2A-5D77E2E3DCF4}" destId="{91F87420-E9EE-4440-B2D6-E4D049468E71}" srcOrd="0" destOrd="0" presId="urn:microsoft.com/office/officeart/2005/8/layout/process3"/>
+    <dgm:cxn modelId="{DC62AF0E-A838-4348-87F9-B523E0879D3F}" srcId="{8C05E1F9-B9EC-4103-9066-F9C00B692045}" destId="{0ADC1D22-DB74-4A5A-A947-3050E9608AC9}" srcOrd="2" destOrd="0" parTransId="{73A3E9FB-FC04-4E6A-ACAF-022FFC6B99EA}" sibTransId="{133E6027-F6DA-40FD-A3F3-BBAF7A485A11}"/>
+    <dgm:cxn modelId="{5A8DD511-AE65-4833-A71F-7025B756BF21}" type="presOf" srcId="{31DA040D-4AE9-4F07-9B59-0535216902AF}" destId="{76C19E85-E0EF-4792-A9BD-34B0E0AB515F}" srcOrd="0" destOrd="0" presId="urn:microsoft.com/office/officeart/2005/8/layout/process3"/>
+    <dgm:cxn modelId="{D5FFDA15-AABA-4A91-B0EE-A05511B45A2B}" type="presOf" srcId="{FAE59212-B71D-49CD-9B7B-AA8BE0B7918E}" destId="{530492D3-010D-4CA5-8ED8-4CE447EDCC1F}" srcOrd="1" destOrd="0" presId="urn:microsoft.com/office/officeart/2005/8/layout/process3"/>
+    <dgm:cxn modelId="{D2088716-886B-4B3A-A07A-AA25BDD2D50D}" srcId="{FAE59212-B71D-49CD-9B7B-AA8BE0B7918E}" destId="{188AA136-94BE-4647-8C67-3E0F99953608}" srcOrd="0" destOrd="0" parTransId="{A89EA629-F41E-4A7A-96AE-CB80D7434974}" sibTransId="{582403EC-A0B4-479E-B7A0-4EE584E7461E}"/>
+    <dgm:cxn modelId="{43FB1C1F-6A3E-4229-96AD-7D25EE11A4A8}" srcId="{ED30401C-734E-48E5-A434-7B9620412364}" destId="{DE2D4699-6F9D-42B3-87EC-A357A57566CD}" srcOrd="1" destOrd="0" parTransId="{04442720-B6AD-440F-AF4E-227A5116DBEA}" sibTransId="{61DB6E9B-7F62-4BAC-9662-926C00658932}"/>
     <dgm:cxn modelId="{C250661F-C32B-445E-9159-092754883963}" type="presOf" srcId="{FAE59212-B71D-49CD-9B7B-AA8BE0B7918E}" destId="{7D8A88CD-F859-42AB-A052-0A29AB6E38EA}" srcOrd="0" destOrd="0" presId="urn:microsoft.com/office/officeart/2005/8/layout/process3"/>
-    <dgm:cxn modelId="{70C88B83-D99C-41D1-9B72-7FCB6D535543}" type="presOf" srcId="{8C05E1F9-B9EC-4103-9066-F9C00B692045}" destId="{0F2F6CCF-5372-441E-99D3-4E8C82136419}" srcOrd="1" destOrd="0" presId="urn:microsoft.com/office/officeart/2005/8/layout/process3"/>
-    <dgm:cxn modelId="{9CD474D3-BC32-4257-8246-2F518370EE1C}" type="presOf" srcId="{A2F84F48-1F89-40E8-A586-DA3E0EA61414}" destId="{0A05BB02-13B0-40F9-8B57-65152B0FB439}" srcOrd="0" destOrd="1" presId="urn:microsoft.com/office/officeart/2005/8/layout/process3"/>
-    <dgm:cxn modelId="{AECEF381-77E9-4C27-B444-DD5842F04484}" srcId="{ED30401C-734E-48E5-A434-7B9620412364}" destId="{A2F84F48-1F89-40E8-A586-DA3E0EA61414}" srcOrd="1" destOrd="0" parTransId="{B88A6A01-0985-47C9-9F15-B3C3261B443B}" sibTransId="{81A8D28F-CAF0-4363-9091-571FC59AEE81}"/>
-    <dgm:cxn modelId="{EEF58507-5FDE-4AC5-9B4E-2D2F41F11658}" type="presOf" srcId="{A7358417-CF10-478E-BD2A-5D77E2E3DCF4}" destId="{91F87420-E9EE-4440-B2D6-E4D049468E71}" srcOrd="0" destOrd="0" presId="urn:microsoft.com/office/officeart/2005/8/layout/process3"/>
-    <dgm:cxn modelId="{7B1532E7-DE99-45BE-960E-532B43B9A536}" type="presOf" srcId="{8C05E1F9-B9EC-4103-9066-F9C00B692045}" destId="{B40CF274-05D2-4C42-91E4-044818EC0AC4}" srcOrd="0" destOrd="0" presId="urn:microsoft.com/office/officeart/2005/8/layout/process3"/>
-    <dgm:cxn modelId="{D5FFDA15-AABA-4A91-B0EE-A05511B45A2B}" type="presOf" srcId="{FAE59212-B71D-49CD-9B7B-AA8BE0B7918E}" destId="{530492D3-010D-4CA5-8ED8-4CE447EDCC1F}" srcOrd="1" destOrd="0" presId="urn:microsoft.com/office/officeart/2005/8/layout/process3"/>
-    <dgm:cxn modelId="{5A8DD511-AE65-4833-A71F-7025B756BF21}" type="presOf" srcId="{31DA040D-4AE9-4F07-9B59-0535216902AF}" destId="{76C19E85-E0EF-4792-A9BD-34B0E0AB515F}" srcOrd="0" destOrd="0" presId="urn:microsoft.com/office/officeart/2005/8/layout/process3"/>
-    <dgm:cxn modelId="{10B436A5-62CC-43FD-98BD-F39CEC9ADA5F}" srcId="{6209FE2A-9EDD-471E-AF57-4211626FC7CE}" destId="{909389E1-1BE9-44A2-93C0-088EB88E0FD5}" srcOrd="0" destOrd="0" parTransId="{0423086D-8A3F-46EF-BC50-C6719150479F}" sibTransId="{6EFE9C19-74CA-47D3-9CAD-66BE8D70E903}"/>
-    <dgm:cxn modelId="{DC62AF0E-A838-4348-87F9-B523E0879D3F}" srcId="{8C05E1F9-B9EC-4103-9066-F9C00B692045}" destId="{0ADC1D22-DB74-4A5A-A947-3050E9608AC9}" srcOrd="1" destOrd="0" parTransId="{73A3E9FB-FC04-4E6A-ACAF-022FFC6B99EA}" sibTransId="{133E6027-F6DA-40FD-A3F3-BBAF7A485A11}"/>
     <dgm:cxn modelId="{3F342B29-55A4-4311-A47E-B06842EE07A3}" type="presOf" srcId="{A7358417-CF10-478E-BD2A-5D77E2E3DCF4}" destId="{E8BAC395-FDB7-4FCF-8252-80C57262D34F}" srcOrd="1" destOrd="0" presId="urn:microsoft.com/office/officeart/2005/8/layout/process3"/>
     <dgm:cxn modelId="{4F79083C-C830-43FC-8C95-E034D698A591}" type="presOf" srcId="{C5BD7796-FABB-4CA7-9571-FDE5CB30A979}" destId="{F73DD41F-35DD-4F4D-BC42-3A1B87B0FA8E}" srcOrd="0" destOrd="0" presId="urn:microsoft.com/office/officeart/2005/8/layout/process3"/>
+    <dgm:cxn modelId="{BD4E5240-1543-48D3-84C3-45EAE6C17C6E}" type="presOf" srcId="{188AA136-94BE-4647-8C67-3E0F99953608}" destId="{10A1F8E8-AE67-473C-9E01-C525D133753A}" srcOrd="0" destOrd="0" presId="urn:microsoft.com/office/officeart/2005/8/layout/process3"/>
+    <dgm:cxn modelId="{8240DE41-3A26-4A5A-B104-0D10A5F70A21}" srcId="{C5BD7796-FABB-4CA7-9571-FDE5CB30A979}" destId="{FAE59212-B71D-49CD-9B7B-AA8BE0B7918E}" srcOrd="2" destOrd="0" parTransId="{641C9468-CB89-4748-BD0C-E0C1EDDA898F}" sibTransId="{A7358417-CF10-478E-BD2A-5D77E2E3DCF4}"/>
+    <dgm:cxn modelId="{A2941F64-2BBC-4D22-991C-8CC44D4A498C}" type="presOf" srcId="{31DA040D-4AE9-4F07-9B59-0535216902AF}" destId="{3423E1C8-8763-48F1-8E54-A20D1EA6BE13}" srcOrd="1" destOrd="0" presId="urn:microsoft.com/office/officeart/2005/8/layout/process3"/>
+    <dgm:cxn modelId="{CCC52E47-7798-46F6-9187-0F2E5CEF63D6}" type="presOf" srcId="{3EE3A445-652B-425B-BB7E-DE19712B873C}" destId="{B59A95E1-F890-4441-B6A7-E562DEFE1C5F}" srcOrd="0" destOrd="1" presId="urn:microsoft.com/office/officeart/2005/8/layout/process3"/>
+    <dgm:cxn modelId="{EF8C4847-1DE9-4EC5-87D9-7317BF8C5B83}" type="presOf" srcId="{6209FE2A-9EDD-471E-AF57-4211626FC7CE}" destId="{6DCC0F79-DACB-48E1-97DC-3BA53E89FDB6}" srcOrd="1" destOrd="0" presId="urn:microsoft.com/office/officeart/2005/8/layout/process3"/>
+    <dgm:cxn modelId="{5A5B2770-2B5F-4399-9DFE-2E97E4C4599F}" srcId="{8C05E1F9-B9EC-4103-9066-F9C00B692045}" destId="{6F90A93B-F7CC-42B6-8981-1ED37DB38E8D}" srcOrd="0" destOrd="0" parTransId="{7619CA39-ACD3-4B29-B150-529826EFBBA4}" sibTransId="{4A667A21-AE1E-4F47-B209-B343589D8E32}"/>
+    <dgm:cxn modelId="{30712A75-4052-49CE-8024-8E95CD9A5738}" srcId="{C5BD7796-FABB-4CA7-9571-FDE5CB30A979}" destId="{8C05E1F9-B9EC-4103-9066-F9C00B692045}" srcOrd="0" destOrd="0" parTransId="{82C7D105-E600-4613-8A1C-F1812FF371A3}" sibTransId="{CFB111AD-D60C-4179-A508-526A3292D9A7}"/>
+    <dgm:cxn modelId="{34BB9277-28C5-4CDA-8F6B-4CE69147A159}" srcId="{C5BD7796-FABB-4CA7-9571-FDE5CB30A979}" destId="{6209FE2A-9EDD-471E-AF57-4211626FC7CE}" srcOrd="3" destOrd="0" parTransId="{730AE77E-7478-41E9-ACD9-F77F867E7875}" sibTransId="{6CE623B9-7DF1-473F-879C-FDB269BBD2EB}"/>
+    <dgm:cxn modelId="{A4D85858-56B9-4BE4-8B31-9F4C735D9FC4}" type="presOf" srcId="{ED30401C-734E-48E5-A434-7B9620412364}" destId="{BC70D6B9-2A9D-48E9-80DA-B14C59660136}" srcOrd="0" destOrd="0" presId="urn:microsoft.com/office/officeart/2005/8/layout/process3"/>
+    <dgm:cxn modelId="{AECEF381-77E9-4C27-B444-DD5842F04484}" srcId="{ED30401C-734E-48E5-A434-7B9620412364}" destId="{A2F84F48-1F89-40E8-A586-DA3E0EA61414}" srcOrd="2" destOrd="0" parTransId="{B88A6A01-0985-47C9-9F15-B3C3261B443B}" sibTransId="{81A8D28F-CAF0-4363-9091-571FC59AEE81}"/>
+    <dgm:cxn modelId="{70C88B83-D99C-41D1-9B72-7FCB6D535543}" type="presOf" srcId="{8C05E1F9-B9EC-4103-9066-F9C00B692045}" destId="{0F2F6CCF-5372-441E-99D3-4E8C82136419}" srcOrd="1" destOrd="0" presId="urn:microsoft.com/office/officeart/2005/8/layout/process3"/>
+    <dgm:cxn modelId="{4DB04A85-4943-4B57-B7B2-4FC9B40F30DC}" type="presOf" srcId="{909389E1-1BE9-44A2-93C0-088EB88E0FD5}" destId="{8BFDD63F-4409-42BE-AFA9-DA5674CCA82A}" srcOrd="0" destOrd="0" presId="urn:microsoft.com/office/officeart/2005/8/layout/process3"/>
+    <dgm:cxn modelId="{7DD2B586-B179-411A-8919-E494623775E5}" srcId="{ED30401C-734E-48E5-A434-7B9620412364}" destId="{C0C892C4-E63A-4CF4-B102-EB7714676B47}" srcOrd="3" destOrd="0" parTransId="{4EEC3343-245D-41C8-A573-3CA06FD92081}" sibTransId="{6D7B9D93-213C-4CE0-B2BB-D1E59F90EDD4}"/>
+    <dgm:cxn modelId="{EF1B6894-7BD5-4913-A838-DF6FEFE5789C}" type="presOf" srcId="{C0C892C4-E63A-4CF4-B102-EB7714676B47}" destId="{0A05BB02-13B0-40F9-8B57-65152B0FB439}" srcOrd="0" destOrd="3" presId="urn:microsoft.com/office/officeart/2005/8/layout/process3"/>
+    <dgm:cxn modelId="{10B436A5-62CC-43FD-98BD-F39CEC9ADA5F}" srcId="{6209FE2A-9EDD-471E-AF57-4211626FC7CE}" destId="{909389E1-1BE9-44A2-93C0-088EB88E0FD5}" srcOrd="0" destOrd="0" parTransId="{0423086D-8A3F-46EF-BC50-C6719150479F}" sibTransId="{6EFE9C19-74CA-47D3-9CAD-66BE8D70E903}"/>
+    <dgm:cxn modelId="{B65102A8-5447-4ED1-A375-34C47EDE86BD}" type="presOf" srcId="{6F90A93B-F7CC-42B6-8981-1ED37DB38E8D}" destId="{B59A95E1-F890-4441-B6A7-E562DEFE1C5F}" srcOrd="0" destOrd="0" presId="urn:microsoft.com/office/officeart/2005/8/layout/process3"/>
+    <dgm:cxn modelId="{8717E7BC-53FB-4990-93BE-6C15E8F554A8}" type="presOf" srcId="{F7F84BDD-D210-4888-985E-B931BE8B599F}" destId="{0A05BB02-13B0-40F9-8B57-65152B0FB439}" srcOrd="0" destOrd="0" presId="urn:microsoft.com/office/officeart/2005/8/layout/process3"/>
+    <dgm:cxn modelId="{9CD474D3-BC32-4257-8246-2F518370EE1C}" type="presOf" srcId="{A2F84F48-1F89-40E8-A586-DA3E0EA61414}" destId="{0A05BB02-13B0-40F9-8B57-65152B0FB439}" srcOrd="0" destOrd="2" presId="urn:microsoft.com/office/officeart/2005/8/layout/process3"/>
+    <dgm:cxn modelId="{601410DA-F8C9-4BFF-AFF7-C9453A153DED}" type="presOf" srcId="{CFB111AD-D60C-4179-A508-526A3292D9A7}" destId="{09767F3E-F1E1-4A8F-ADA8-1CDDDC2475A9}" srcOrd="1" destOrd="0" presId="urn:microsoft.com/office/officeart/2005/8/layout/process3"/>
+    <dgm:cxn modelId="{7B1532E7-DE99-45BE-960E-532B43B9A536}" type="presOf" srcId="{8C05E1F9-B9EC-4103-9066-F9C00B692045}" destId="{B40CF274-05D2-4C42-91E4-044818EC0AC4}" srcOrd="0" destOrd="0" presId="urn:microsoft.com/office/officeart/2005/8/layout/process3"/>
+    <dgm:cxn modelId="{4B9E57EC-30F0-4E88-B134-D0565F81EBD7}" type="presOf" srcId="{DE2D4699-6F9D-42B3-87EC-A357A57566CD}" destId="{0A05BB02-13B0-40F9-8B57-65152B0FB439}" srcOrd="0" destOrd="1" presId="urn:microsoft.com/office/officeart/2005/8/layout/process3"/>
+    <dgm:cxn modelId="{118C9EF4-F276-41B2-AC90-A7B723AE71C9}" srcId="{8C05E1F9-B9EC-4103-9066-F9C00B692045}" destId="{3EE3A445-652B-425B-BB7E-DE19712B873C}" srcOrd="1" destOrd="0" parTransId="{720A59EE-F0EF-480F-AD22-CD8BB9007034}" sibTransId="{7619B03D-FEF4-44F3-ADD8-5746F3544BD0}"/>
+    <dgm:cxn modelId="{7C82E2F5-0559-4B4E-A9FD-795EA1A51DED}" type="presOf" srcId="{0ADC1D22-DB74-4A5A-A947-3050E9608AC9}" destId="{B59A95E1-F890-4441-B6A7-E562DEFE1C5F}" srcOrd="0" destOrd="2" presId="urn:microsoft.com/office/officeart/2005/8/layout/process3"/>
+    <dgm:cxn modelId="{361651F6-B502-4C90-AE59-D1692080FC51}" type="presOf" srcId="{CFB111AD-D60C-4179-A508-526A3292D9A7}" destId="{35EF949C-AC59-41B1-9F03-BA20A3B1BB48}" srcOrd="0" destOrd="0" presId="urn:microsoft.com/office/officeart/2005/8/layout/process3"/>
     <dgm:cxn modelId="{E64BDDF8-A1FF-4C9C-9F9C-D98D11553E41}" srcId="{C5BD7796-FABB-4CA7-9571-FDE5CB30A979}" destId="{ED30401C-734E-48E5-A434-7B9620412364}" srcOrd="1" destOrd="0" parTransId="{0CEA4416-2B69-461E-B1CE-3774FEE4A7F9}" sibTransId="{31DA040D-4AE9-4F07-9B59-0535216902AF}"/>
-    <dgm:cxn modelId="{A2941F64-2BBC-4D22-991C-8CC44D4A498C}" type="presOf" srcId="{31DA040D-4AE9-4F07-9B59-0535216902AF}" destId="{3423E1C8-8763-48F1-8E54-A20D1EA6BE13}" srcOrd="1" destOrd="0" presId="urn:microsoft.com/office/officeart/2005/8/layout/process3"/>
+    <dgm:cxn modelId="{4238D8F9-6F2D-45C9-88A5-5EA43CE9E321}" type="presOf" srcId="{6209FE2A-9EDD-471E-AF57-4211626FC7CE}" destId="{51D81FF2-2E78-4FDC-914B-18FC7DAC01F5}" srcOrd="0" destOrd="0" presId="urn:microsoft.com/office/officeart/2005/8/layout/process3"/>
     <dgm:cxn modelId="{7AA174FA-546A-41EF-87B4-C2F38146AAD0}" type="presOf" srcId="{ED30401C-734E-48E5-A434-7B9620412364}" destId="{E5A34154-80F8-4759-B975-5885C283A6EA}" srcOrd="1" destOrd="0" presId="urn:microsoft.com/office/officeart/2005/8/layout/process3"/>
-    <dgm:cxn modelId="{34BB9277-28C5-4CDA-8F6B-4CE69147A159}" srcId="{C5BD7796-FABB-4CA7-9571-FDE5CB30A979}" destId="{6209FE2A-9EDD-471E-AF57-4211626FC7CE}" srcOrd="3" destOrd="0" parTransId="{730AE77E-7478-41E9-ACD9-F77F867E7875}" sibTransId="{6CE623B9-7DF1-473F-879C-FDB269BBD2EB}"/>
-    <dgm:cxn modelId="{D2088716-886B-4B3A-A07A-AA25BDD2D50D}" srcId="{FAE59212-B71D-49CD-9B7B-AA8BE0B7918E}" destId="{188AA136-94BE-4647-8C67-3E0F99953608}" srcOrd="0" destOrd="0" parTransId="{A89EA629-F41E-4A7A-96AE-CB80D7434974}" sibTransId="{582403EC-A0B4-479E-B7A0-4EE584E7461E}"/>
-    <dgm:cxn modelId="{30712A75-4052-49CE-8024-8E95CD9A5738}" srcId="{C5BD7796-FABB-4CA7-9571-FDE5CB30A979}" destId="{8C05E1F9-B9EC-4103-9066-F9C00B692045}" srcOrd="0" destOrd="0" parTransId="{82C7D105-E600-4613-8A1C-F1812FF371A3}" sibTransId="{CFB111AD-D60C-4179-A508-526A3292D9A7}"/>
-    <dgm:cxn modelId="{B65102A8-5447-4ED1-A375-34C47EDE86BD}" type="presOf" srcId="{6F90A93B-F7CC-42B6-8981-1ED37DB38E8D}" destId="{B59A95E1-F890-4441-B6A7-E562DEFE1C5F}" srcOrd="0" destOrd="0" presId="urn:microsoft.com/office/officeart/2005/8/layout/process3"/>
-    <dgm:cxn modelId="{EF8C4847-1DE9-4EC5-87D9-7317BF8C5B83}" type="presOf" srcId="{6209FE2A-9EDD-471E-AF57-4211626FC7CE}" destId="{6DCC0F79-DACB-48E1-97DC-3BA53E89FDB6}" srcOrd="1" destOrd="0" presId="urn:microsoft.com/office/officeart/2005/8/layout/process3"/>
-    <dgm:cxn modelId="{601410DA-F8C9-4BFF-AFF7-C9453A153DED}" type="presOf" srcId="{CFB111AD-D60C-4179-A508-526A3292D9A7}" destId="{09767F3E-F1E1-4A8F-ADA8-1CDDDC2475A9}" srcOrd="1" destOrd="0" presId="urn:microsoft.com/office/officeart/2005/8/layout/process3"/>
+    <dgm:cxn modelId="{DCE4BEFB-D577-417E-BF8A-70F14231060E}" srcId="{ED30401C-734E-48E5-A434-7B9620412364}" destId="{F7F84BDD-D210-4888-985E-B931BE8B599F}" srcOrd="0" destOrd="0" parTransId="{54F0CF01-D8DD-4A6B-9C60-FCC01C163D1F}" sibTransId="{5F0A60DE-26E2-4E29-ACC9-81B8AA6DD4C7}"/>
     <dgm:cxn modelId="{33738DDF-FF6F-43EE-9AD9-F04F99CD8E4F}" type="presParOf" srcId="{F73DD41F-35DD-4F4D-BC42-3A1B87B0FA8E}" destId="{7AC11D21-5B1A-4A19-AF72-F2A832AB137E}" srcOrd="0" destOrd="0" presId="urn:microsoft.com/office/officeart/2005/8/layout/process3"/>
     <dgm:cxn modelId="{62D1216C-428B-4CCA-AF73-26679595CC0E}" type="presParOf" srcId="{7AC11D21-5B1A-4A19-AF72-F2A832AB137E}" destId="{B40CF274-05D2-4C42-91E4-044818EC0AC4}" srcOrd="0" destOrd="0" presId="urn:microsoft.com/office/officeart/2005/8/layout/process3"/>
     <dgm:cxn modelId="{73F0C86C-3F83-4961-83F0-6BA18C37C01F}" type="presParOf" srcId="{7AC11D21-5B1A-4A19-AF72-F2A832AB137E}" destId="{0F2F6CCF-5372-441E-99D3-4E8C82136419}" srcOrd="1" destOrd="0" presId="urn:microsoft.com/office/officeart/2005/8/layout/process3"/>
@@ -1480,7 +1567,7 @@
       </dsp:nvSpPr>
       <dsp:spPr>
         <a:xfrm>
-          <a:off x="1438" y="1367651"/>
+          <a:off x="1438" y="579926"/>
           <a:ext cx="1807898" cy="777599"/>
         </a:xfrm>
         <a:prstGeom prst="roundRect">
@@ -1529,7 +1616,7 @@
         </a:bodyPr>
         <a:lstStyle/>
         <a:p>
-          <a:pPr lvl="0" algn="l" defTabSz="800100">
+          <a:pPr marL="0" lvl="0" indent="0" algn="l" defTabSz="800100">
             <a:lnSpc>
               <a:spcPct val="90000"/>
             </a:lnSpc>
@@ -1539,16 +1626,16 @@
             <a:spcAft>
               <a:spcPct val="35000"/>
             </a:spcAft>
+            <a:buNone/>
           </a:pPr>
           <a:r>
-            <a:rPr lang="en-US" sz="1800" kern="1200" dirty="0" smtClean="0"/>
+            <a:rPr lang="en-US" sz="1800" kern="1200" dirty="0"/>
             <a:t>Obtain Data</a:t>
           </a:r>
-          <a:endParaRPr lang="en-US" sz="1800" kern="1200" dirty="0"/>
         </a:p>
       </dsp:txBody>
       <dsp:txXfrm>
-        <a:off x="1438" y="1367651"/>
+        <a:off x="1438" y="579926"/>
         <a:ext cx="1807898" cy="518400"/>
       </dsp:txXfrm>
     </dsp:sp>
@@ -1559,8 +1646,8 @@
       </dsp:nvSpPr>
       <dsp:spPr>
         <a:xfrm>
-          <a:off x="371731" y="1886051"/>
-          <a:ext cx="1807898" cy="1697962"/>
+          <a:off x="371731" y="1098326"/>
+          <a:ext cx="1807898" cy="3273412"/>
         </a:xfrm>
         <a:prstGeom prst="roundRect">
           <a:avLst>
@@ -1617,12 +1704,26 @@
             <a:spcAft>
               <a:spcPct val="15000"/>
             </a:spcAft>
-            <a:buChar char="••"/>
+            <a:buChar char="•"/>
           </a:pPr>
           <a:r>
-            <a:rPr lang="en-US" sz="1800" kern="1200" dirty="0" smtClean="0"/>
+            <a:rPr lang="en-US" sz="1800" kern="1200" dirty="0"/>
             <a:t>Google Trends</a:t>
           </a:r>
+        </a:p>
+        <a:p>
+          <a:pPr marL="171450" lvl="1" indent="-171450" algn="l" defTabSz="800100">
+            <a:lnSpc>
+              <a:spcPct val="90000"/>
+            </a:lnSpc>
+            <a:spcBef>
+              <a:spcPct val="0"/>
+            </a:spcBef>
+            <a:spcAft>
+              <a:spcPct val="15000"/>
+            </a:spcAft>
+            <a:buChar char="•"/>
+          </a:pPr>
           <a:endParaRPr lang="en-US" sz="1800" kern="1200" dirty="0"/>
         </a:p>
         <a:p>
@@ -1636,18 +1737,17 @@
             <a:spcAft>
               <a:spcPct val="15000"/>
             </a:spcAft>
-            <a:buChar char="••"/>
+            <a:buChar char="•"/>
           </a:pPr>
           <a:r>
-            <a:rPr lang="en-US" sz="1800" kern="1200" dirty="0" smtClean="0"/>
+            <a:rPr lang="en-US" sz="1800" kern="1200" dirty="0"/>
             <a:t>Yahoo Finance</a:t>
           </a:r>
-          <a:endParaRPr lang="en-US" sz="1800" kern="1200" dirty="0"/>
         </a:p>
       </dsp:txBody>
       <dsp:txXfrm>
-        <a:off x="421463" y="1935783"/>
-        <a:ext cx="1708434" cy="1598498"/>
+        <a:off x="424683" y="1151278"/>
+        <a:ext cx="1701994" cy="3167508"/>
       </dsp:txXfrm>
     </dsp:sp>
     <dsp:sp modelId="{35EF949C-AC59-41B1-9F03-BA20A3B1BB48}">
@@ -1657,7 +1757,7 @@
       </dsp:nvSpPr>
       <dsp:spPr>
         <a:xfrm>
-          <a:off x="2083408" y="1401794"/>
+          <a:off x="2083408" y="614069"/>
           <a:ext cx="581030" cy="450114"/>
         </a:xfrm>
         <a:prstGeom prst="rightArrow">
@@ -1700,7 +1800,7 @@
         </a:bodyPr>
         <a:lstStyle/>
         <a:p>
-          <a:pPr lvl="0" algn="ctr" defTabSz="622300">
+          <a:pPr marL="0" lvl="0" indent="0" algn="ctr" defTabSz="622300">
             <a:lnSpc>
               <a:spcPct val="90000"/>
             </a:lnSpc>
@@ -1710,12 +1810,13 @@
             <a:spcAft>
               <a:spcPct val="35000"/>
             </a:spcAft>
+            <a:buNone/>
           </a:pPr>
           <a:endParaRPr lang="en-US" sz="1400" kern="1200"/>
         </a:p>
       </dsp:txBody>
       <dsp:txXfrm>
-        <a:off x="2083408" y="1491817"/>
+        <a:off x="2083408" y="704092"/>
         <a:ext cx="445996" cy="270068"/>
       </dsp:txXfrm>
     </dsp:sp>
@@ -1726,7 +1827,7 @@
       </dsp:nvSpPr>
       <dsp:spPr>
         <a:xfrm>
-          <a:off x="2905620" y="1367651"/>
+          <a:off x="2905620" y="579926"/>
           <a:ext cx="1807898" cy="777599"/>
         </a:xfrm>
         <a:prstGeom prst="roundRect">
@@ -1775,7 +1876,7 @@
         </a:bodyPr>
         <a:lstStyle/>
         <a:p>
-          <a:pPr lvl="0" algn="l" defTabSz="800100">
+          <a:pPr marL="0" lvl="0" indent="0" algn="l" defTabSz="800100">
             <a:lnSpc>
               <a:spcPct val="90000"/>
             </a:lnSpc>
@@ -1785,16 +1886,16 @@
             <a:spcAft>
               <a:spcPct val="35000"/>
             </a:spcAft>
+            <a:buNone/>
           </a:pPr>
           <a:r>
-            <a:rPr lang="en-US" sz="1800" kern="1200" dirty="0" smtClean="0"/>
+            <a:rPr lang="en-US" sz="1800" kern="1200" dirty="0"/>
             <a:t>Manipulate</a:t>
           </a:r>
-          <a:endParaRPr lang="en-US" sz="1800" kern="1200" dirty="0"/>
         </a:p>
       </dsp:txBody>
       <dsp:txXfrm>
-        <a:off x="2905620" y="1367651"/>
+        <a:off x="2905620" y="579926"/>
         <a:ext cx="1807898" cy="518400"/>
       </dsp:txXfrm>
     </dsp:sp>
@@ -1805,8 +1906,8 @@
       </dsp:nvSpPr>
       <dsp:spPr>
         <a:xfrm>
-          <a:off x="3275913" y="1886051"/>
-          <a:ext cx="1807898" cy="1697962"/>
+          <a:off x="3275913" y="1098326"/>
+          <a:ext cx="1807898" cy="3273412"/>
         </a:xfrm>
         <a:prstGeom prst="roundRect">
           <a:avLst>
@@ -1863,13 +1964,12 @@
             <a:spcAft>
               <a:spcPct val="15000"/>
             </a:spcAft>
-            <a:buChar char="••"/>
+            <a:buChar char="•"/>
           </a:pPr>
           <a:r>
-            <a:rPr lang="en-US" sz="1800" kern="1200" dirty="0" smtClean="0"/>
-            <a:t>Calculate weekly averages</a:t>
+            <a:rPr lang="en-US" sz="1800" kern="1200" dirty="0"/>
+            <a:t>Calculate returns</a:t>
           </a:r>
-          <a:endParaRPr lang="en-US" sz="1800" kern="1200" dirty="0"/>
         </a:p>
         <a:p>
           <a:pPr marL="171450" lvl="1" indent="-171450" algn="l" defTabSz="800100">
@@ -1882,18 +1982,53 @@
             <a:spcAft>
               <a:spcPct val="15000"/>
             </a:spcAft>
-            <a:buChar char="••"/>
+            <a:buChar char="•"/>
           </a:pPr>
           <a:r>
-            <a:rPr lang="en-US" sz="1800" kern="1200" dirty="0" smtClean="0"/>
+            <a:rPr lang="en-US" sz="1800" kern="1200" dirty="0"/>
+            <a:t>Calculate weekly averages</a:t>
+          </a:r>
+        </a:p>
+        <a:p>
+          <a:pPr marL="171450" lvl="1" indent="-171450" algn="l" defTabSz="800100">
+            <a:lnSpc>
+              <a:spcPct val="90000"/>
+            </a:lnSpc>
+            <a:spcBef>
+              <a:spcPct val="0"/>
+            </a:spcBef>
+            <a:spcAft>
+              <a:spcPct val="15000"/>
+            </a:spcAft>
+            <a:buChar char="•"/>
+          </a:pPr>
+          <a:r>
+            <a:rPr lang="en-US" sz="1800" kern="1200" dirty="0"/>
             <a:t>Account for holidays</a:t>
           </a:r>
-          <a:endParaRPr lang="en-US" sz="1800" kern="1200" dirty="0"/>
+        </a:p>
+        <a:p>
+          <a:pPr marL="171450" lvl="1" indent="-171450" algn="l" defTabSz="800100">
+            <a:lnSpc>
+              <a:spcPct val="90000"/>
+            </a:lnSpc>
+            <a:spcBef>
+              <a:spcPct val="0"/>
+            </a:spcBef>
+            <a:spcAft>
+              <a:spcPct val="15000"/>
+            </a:spcAft>
+            <a:buChar char="•"/>
+          </a:pPr>
+          <a:r>
+            <a:rPr lang="en-US" sz="1800" kern="1200" dirty="0"/>
+            <a:t>Identify weeks with greatest losses</a:t>
+          </a:r>
         </a:p>
       </dsp:txBody>
       <dsp:txXfrm>
-        <a:off x="3325645" y="1935783"/>
-        <a:ext cx="1708434" cy="1598498"/>
+        <a:off x="3328865" y="1151278"/>
+        <a:ext cx="1701994" cy="3167508"/>
       </dsp:txXfrm>
     </dsp:sp>
     <dsp:sp modelId="{76C19E85-E0EF-4792-A9BD-34B0E0AB515F}">
@@ -1903,7 +2038,7 @@
       </dsp:nvSpPr>
       <dsp:spPr>
         <a:xfrm>
-          <a:off x="4987590" y="1401794"/>
+          <a:off x="4987590" y="614069"/>
           <a:ext cx="581030" cy="450114"/>
         </a:xfrm>
         <a:prstGeom prst="rightArrow">
@@ -1946,7 +2081,7 @@
         </a:bodyPr>
         <a:lstStyle/>
         <a:p>
-          <a:pPr lvl="0" algn="ctr" defTabSz="622300">
+          <a:pPr marL="0" lvl="0" indent="0" algn="ctr" defTabSz="622300">
             <a:lnSpc>
               <a:spcPct val="90000"/>
             </a:lnSpc>
@@ -1956,12 +2091,13 @@
             <a:spcAft>
               <a:spcPct val="35000"/>
             </a:spcAft>
+            <a:buNone/>
           </a:pPr>
           <a:endParaRPr lang="en-US" sz="1400" kern="1200"/>
         </a:p>
       </dsp:txBody>
       <dsp:txXfrm>
-        <a:off x="4987590" y="1491817"/>
+        <a:off x="4987590" y="704092"/>
         <a:ext cx="445996" cy="270068"/>
       </dsp:txXfrm>
     </dsp:sp>
@@ -1972,7 +2108,7 @@
       </dsp:nvSpPr>
       <dsp:spPr>
         <a:xfrm>
-          <a:off x="5809803" y="1367651"/>
+          <a:off x="5809803" y="579926"/>
           <a:ext cx="1807898" cy="777599"/>
         </a:xfrm>
         <a:prstGeom prst="roundRect">
@@ -2021,7 +2157,7 @@
         </a:bodyPr>
         <a:lstStyle/>
         <a:p>
-          <a:pPr lvl="0" algn="l" defTabSz="800100">
+          <a:pPr marL="0" lvl="0" indent="0" algn="l" defTabSz="800100">
             <a:lnSpc>
               <a:spcPct val="90000"/>
             </a:lnSpc>
@@ -2031,16 +2167,16 @@
             <a:spcAft>
               <a:spcPct val="35000"/>
             </a:spcAft>
+            <a:buNone/>
           </a:pPr>
           <a:r>
-            <a:rPr lang="en-US" sz="1800" kern="1200" dirty="0" smtClean="0"/>
+            <a:rPr lang="en-US" sz="1800" kern="1200" dirty="0"/>
             <a:t>Explore</a:t>
           </a:r>
-          <a:endParaRPr lang="en-US" sz="1800" kern="1200" dirty="0"/>
         </a:p>
       </dsp:txBody>
       <dsp:txXfrm>
-        <a:off x="5809803" y="1367651"/>
+        <a:off x="5809803" y="579926"/>
         <a:ext cx="1807898" cy="518400"/>
       </dsp:txXfrm>
     </dsp:sp>
@@ -2051,8 +2187,8 @@
       </dsp:nvSpPr>
       <dsp:spPr>
         <a:xfrm>
-          <a:off x="6180095" y="1886051"/>
-          <a:ext cx="1807898" cy="1697962"/>
+          <a:off x="6180095" y="1098326"/>
+          <a:ext cx="1807898" cy="3273412"/>
         </a:xfrm>
         <a:prstGeom prst="roundRect">
           <a:avLst>
@@ -2109,18 +2245,17 @@
             <a:spcAft>
               <a:spcPct val="15000"/>
             </a:spcAft>
-            <a:buChar char="••"/>
+            <a:buChar char="•"/>
           </a:pPr>
           <a:r>
-            <a:rPr lang="en-US" sz="1800" kern="1200" dirty="0" smtClean="0"/>
+            <a:rPr lang="en-US" sz="1800" kern="1200" dirty="0"/>
             <a:t>Correlation between stock price &amp; search results</a:t>
           </a:r>
-          <a:endParaRPr lang="en-US" sz="1800" kern="1200" dirty="0"/>
         </a:p>
       </dsp:txBody>
       <dsp:txXfrm>
-        <a:off x="6229827" y="1935783"/>
-        <a:ext cx="1708434" cy="1598498"/>
+        <a:off x="6233047" y="1151278"/>
+        <a:ext cx="1701994" cy="3167508"/>
       </dsp:txXfrm>
     </dsp:sp>
     <dsp:sp modelId="{91F87420-E9EE-4440-B2D6-E4D049468E71}">
@@ -2130,7 +2265,7 @@
       </dsp:nvSpPr>
       <dsp:spPr>
         <a:xfrm>
-          <a:off x="7891772" y="1401794"/>
+          <a:off x="7891772" y="614069"/>
           <a:ext cx="581030" cy="450114"/>
         </a:xfrm>
         <a:prstGeom prst="rightArrow">
@@ -2173,7 +2308,7 @@
         </a:bodyPr>
         <a:lstStyle/>
         <a:p>
-          <a:pPr lvl="0" algn="ctr" defTabSz="622300">
+          <a:pPr marL="0" lvl="0" indent="0" algn="ctr" defTabSz="622300">
             <a:lnSpc>
               <a:spcPct val="90000"/>
             </a:lnSpc>
@@ -2183,12 +2318,13 @@
             <a:spcAft>
               <a:spcPct val="35000"/>
             </a:spcAft>
+            <a:buNone/>
           </a:pPr>
           <a:endParaRPr lang="en-US" sz="1400" kern="1200"/>
         </a:p>
       </dsp:txBody>
       <dsp:txXfrm>
-        <a:off x="7891772" y="1491817"/>
+        <a:off x="7891772" y="704092"/>
         <a:ext cx="445996" cy="270068"/>
       </dsp:txXfrm>
     </dsp:sp>
@@ -2199,7 +2335,7 @@
       </dsp:nvSpPr>
       <dsp:spPr>
         <a:xfrm>
-          <a:off x="8713985" y="1367651"/>
+          <a:off x="8713985" y="579926"/>
           <a:ext cx="1807898" cy="777599"/>
         </a:xfrm>
         <a:prstGeom prst="roundRect">
@@ -2248,7 +2384,7 @@
         </a:bodyPr>
         <a:lstStyle/>
         <a:p>
-          <a:pPr lvl="0" algn="l" defTabSz="800100">
+          <a:pPr marL="0" lvl="0" indent="0" algn="l" defTabSz="800100">
             <a:lnSpc>
               <a:spcPct val="90000"/>
             </a:lnSpc>
@@ -2258,16 +2394,16 @@
             <a:spcAft>
               <a:spcPct val="35000"/>
             </a:spcAft>
+            <a:buNone/>
           </a:pPr>
           <a:r>
-            <a:rPr lang="en-US" sz="1800" kern="1200" dirty="0" smtClean="0"/>
+            <a:rPr lang="en-US" sz="1800" kern="1200" dirty="0"/>
             <a:t>Prediction</a:t>
           </a:r>
-          <a:endParaRPr lang="en-US" sz="1800" kern="1200" dirty="0"/>
         </a:p>
       </dsp:txBody>
       <dsp:txXfrm>
-        <a:off x="8713985" y="1367651"/>
+        <a:off x="8713985" y="579926"/>
         <a:ext cx="1807898" cy="518400"/>
       </dsp:txXfrm>
     </dsp:sp>
@@ -2278,8 +2414,8 @@
       </dsp:nvSpPr>
       <dsp:spPr>
         <a:xfrm>
-          <a:off x="9084277" y="1886051"/>
-          <a:ext cx="1807898" cy="1697962"/>
+          <a:off x="9084277" y="1098326"/>
+          <a:ext cx="1807898" cy="3273412"/>
         </a:xfrm>
         <a:prstGeom prst="roundRect">
           <a:avLst>
@@ -2336,18 +2472,17 @@
             <a:spcAft>
               <a:spcPct val="15000"/>
             </a:spcAft>
-            <a:buChar char="••"/>
+            <a:buChar char="•"/>
           </a:pPr>
           <a:r>
-            <a:rPr lang="en-US" sz="1800" kern="1200" dirty="0" smtClean="0"/>
+            <a:rPr lang="en-US" sz="1800" kern="1200" dirty="0"/>
             <a:t>Determine optimal lags</a:t>
           </a:r>
-          <a:endParaRPr lang="en-US" sz="1800" kern="1200" dirty="0"/>
         </a:p>
       </dsp:txBody>
       <dsp:txXfrm>
-        <a:off x="9134009" y="1935783"/>
-        <a:ext cx="1708434" cy="1598498"/>
+        <a:off x="9137229" y="1151278"/>
+        <a:ext cx="1701994" cy="3167508"/>
       </dsp:txXfrm>
     </dsp:sp>
   </dsp:spTree>
@@ -3771,7 +3906,7 @@
           <a:p>
             <a:fld id="{BE6261E5-A84F-4221-A755-98C0848818C3}" type="datetimeFigureOut">
               <a:rPr lang="en-US" smtClean="0"/>
-              <a:t>3/15/2017</a:t>
+              <a:t>3/16/2017</a:t>
             </a:fld>
             <a:endParaRPr lang="en-US"/>
           </a:p>
@@ -3835,38 +3970,37 @@
           <a:p>
             <a:pPr lvl="0"/>
             <a:r>
-              <a:rPr lang="en-US" smtClean="0"/>
+              <a:rPr lang="en-US"/>
               <a:t>Click to edit Master text styles</a:t>
             </a:r>
           </a:p>
           <a:p>
             <a:pPr lvl="1"/>
             <a:r>
-              <a:rPr lang="en-US" smtClean="0"/>
+              <a:rPr lang="en-US"/>
               <a:t>Second level</a:t>
             </a:r>
           </a:p>
           <a:p>
             <a:pPr lvl="2"/>
             <a:r>
-              <a:rPr lang="en-US" smtClean="0"/>
+              <a:rPr lang="en-US"/>
               <a:t>Third level</a:t>
             </a:r>
           </a:p>
           <a:p>
             <a:pPr lvl="3"/>
             <a:r>
-              <a:rPr lang="en-US" smtClean="0"/>
+              <a:rPr lang="en-US"/>
               <a:t>Fourth level</a:t>
             </a:r>
           </a:p>
           <a:p>
             <a:pPr lvl="4"/>
             <a:r>
-              <a:rPr lang="en-US" smtClean="0"/>
+              <a:rPr lang="en-US"/>
               <a:t>Fifth level</a:t>
             </a:r>
-            <a:endParaRPr lang="en-US"/>
           </a:p>
         </p:txBody>
       </p:sp>
@@ -4165,7 +4299,7 @@
           </a:lstStyle>
           <a:p>
             <a:r>
-              <a:rPr lang="en-US" smtClean="0"/>
+              <a:rPr lang="en-US"/>
               <a:t>Click to edit Master title style</a:t>
             </a:r>
             <a:endParaRPr lang="en-US" dirty="0"/>
@@ -4285,7 +4419,7 @@
           </a:lstStyle>
           <a:p>
             <a:r>
-              <a:rPr lang="en-US" smtClean="0"/>
+              <a:rPr lang="en-US"/>
               <a:t>Click to edit Master subtitle style</a:t>
             </a:r>
             <a:endParaRPr lang="en-US" dirty="0"/>
@@ -4309,7 +4443,7 @@
           <a:p>
             <a:fld id="{A5E07225-8B6E-4997-B967-5103AD87EC84}" type="datetimeFigureOut">
               <a:rPr lang="en-US" smtClean="0"/>
-              <a:t>3/15/2017</a:t>
+              <a:t>3/16/2017</a:t>
             </a:fld>
             <a:endParaRPr lang="en-US"/>
           </a:p>
@@ -4414,7 +4548,7 @@
           </a:lstStyle>
           <a:p>
             <a:r>
-              <a:rPr lang="en-US" smtClean="0"/>
+              <a:rPr lang="en-US"/>
               <a:t>Click to edit Master title style</a:t>
             </a:r>
             <a:endParaRPr lang="en-US" dirty="0"/>
@@ -4493,7 +4627,7 @@
           </a:lstStyle>
           <a:p>
             <a:r>
-              <a:rPr lang="en-US" smtClean="0"/>
+              <a:rPr lang="en-US"/>
               <a:t>Click icon to add picture</a:t>
             </a:r>
             <a:endParaRPr lang="en-US" dirty="0"/>
@@ -4561,7 +4695,7 @@
           <a:p>
             <a:pPr lvl="0"/>
             <a:r>
-              <a:rPr lang="en-US" smtClean="0"/>
+              <a:rPr lang="en-US"/>
               <a:t>Click to edit Master text styles</a:t>
             </a:r>
           </a:p>
@@ -4584,7 +4718,7 @@
           <a:p>
             <a:fld id="{A5E07225-8B6E-4997-B967-5103AD87EC84}" type="datetimeFigureOut">
               <a:rPr lang="en-US" smtClean="0"/>
-              <a:t>3/15/2017</a:t>
+              <a:t>3/16/2017</a:t>
             </a:fld>
             <a:endParaRPr lang="en-US"/>
           </a:p>
@@ -4687,7 +4821,7 @@
           </a:lstStyle>
           <a:p>
             <a:r>
-              <a:rPr lang="en-US" smtClean="0"/>
+              <a:rPr lang="en-US"/>
               <a:t>Click to edit Master title style</a:t>
             </a:r>
             <a:endParaRPr lang="en-US" dirty="0"/>
@@ -4755,7 +4889,7 @@
           <a:p>
             <a:pPr lvl="0"/>
             <a:r>
-              <a:rPr lang="en-US" smtClean="0"/>
+              <a:rPr lang="en-US"/>
               <a:t>Click to edit Master text styles</a:t>
             </a:r>
           </a:p>
@@ -4778,7 +4912,7 @@
           <a:p>
             <a:fld id="{A5E07225-8B6E-4997-B967-5103AD87EC84}" type="datetimeFigureOut">
               <a:rPr lang="en-US" smtClean="0"/>
-              <a:t>3/15/2017</a:t>
+              <a:t>3/16/2017</a:t>
             </a:fld>
             <a:endParaRPr lang="en-US"/>
           </a:p>
@@ -4881,7 +5015,7 @@
           </a:lstStyle>
           <a:p>
             <a:r>
-              <a:rPr lang="en-US" smtClean="0"/>
+              <a:rPr lang="en-US"/>
               <a:t>Click to edit Master title style</a:t>
             </a:r>
             <a:endParaRPr lang="en-US" dirty="0"/>
@@ -4961,7 +5095,7 @@
               <a:buNone/>
             </a:pPr>
             <a:r>
-              <a:rPr lang="en-US" smtClean="0"/>
+              <a:rPr lang="en-US"/>
               <a:t>Click to edit Master text styles</a:t>
             </a:r>
           </a:p>
@@ -5028,7 +5162,7 @@
           <a:p>
             <a:pPr lvl="0"/>
             <a:r>
-              <a:rPr lang="en-US" smtClean="0"/>
+              <a:rPr lang="en-US"/>
               <a:t>Click to edit Master text styles</a:t>
             </a:r>
           </a:p>
@@ -5051,7 +5185,7 @@
           <a:p>
             <a:fld id="{A5E07225-8B6E-4997-B967-5103AD87EC84}" type="datetimeFigureOut">
               <a:rPr lang="en-US" smtClean="0"/>
-              <a:t>3/15/2017</a:t>
+              <a:t>3/16/2017</a:t>
             </a:fld>
             <a:endParaRPr lang="en-US"/>
           </a:p>
@@ -5248,7 +5382,7 @@
           </a:lstStyle>
           <a:p>
             <a:r>
-              <a:rPr lang="en-US" smtClean="0"/>
+              <a:rPr lang="en-US"/>
               <a:t>Click to edit Master title style</a:t>
             </a:r>
             <a:endParaRPr lang="en-US" dirty="0"/>
@@ -5369,7 +5503,7 @@
           <a:p>
             <a:pPr lvl="0"/>
             <a:r>
-              <a:rPr lang="en-US" smtClean="0"/>
+              <a:rPr lang="en-US"/>
               <a:t>Click to edit Master text styles</a:t>
             </a:r>
           </a:p>
@@ -5392,7 +5526,7 @@
           <a:p>
             <a:fld id="{A5E07225-8B6E-4997-B967-5103AD87EC84}" type="datetimeFigureOut">
               <a:rPr lang="en-US" smtClean="0"/>
-              <a:t>3/15/2017</a:t>
+              <a:t>3/16/2017</a:t>
             </a:fld>
             <a:endParaRPr lang="en-US"/>
           </a:p>
@@ -5490,7 +5624,7 @@
           </a:lstStyle>
           <a:p>
             <a:r>
-              <a:rPr lang="en-US" smtClean="0"/>
+              <a:rPr lang="en-US"/>
               <a:t>Click to edit Master title style</a:t>
             </a:r>
             <a:endParaRPr lang="en-US" dirty="0"/>
@@ -5565,7 +5699,7 @@
           <a:p>
             <a:pPr lvl="0"/>
             <a:r>
-              <a:rPr lang="en-US" smtClean="0"/>
+              <a:rPr lang="en-US"/>
               <a:t>Click to edit Master text styles</a:t>
             </a:r>
           </a:p>
@@ -5632,7 +5766,7 @@
           <a:p>
             <a:pPr lvl="0"/>
             <a:r>
-              <a:rPr lang="en-US" smtClean="0"/>
+              <a:rPr lang="en-US"/>
               <a:t>Click to edit Master text styles</a:t>
             </a:r>
           </a:p>
@@ -5706,7 +5840,7 @@
           <a:p>
             <a:pPr lvl="0"/>
             <a:r>
-              <a:rPr lang="en-US" smtClean="0"/>
+              <a:rPr lang="en-US"/>
               <a:t>Click to edit Master text styles</a:t>
             </a:r>
           </a:p>
@@ -5773,7 +5907,7 @@
           <a:p>
             <a:pPr lvl="0"/>
             <a:r>
-              <a:rPr lang="en-US" smtClean="0"/>
+              <a:rPr lang="en-US"/>
               <a:t>Click to edit Master text styles</a:t>
             </a:r>
           </a:p>
@@ -5847,7 +5981,7 @@
           <a:p>
             <a:pPr lvl="0"/>
             <a:r>
-              <a:rPr lang="en-US" smtClean="0"/>
+              <a:rPr lang="en-US"/>
               <a:t>Click to edit Master text styles</a:t>
             </a:r>
           </a:p>
@@ -5914,7 +6048,7 @@
           <a:p>
             <a:pPr lvl="0"/>
             <a:r>
-              <a:rPr lang="en-US" smtClean="0"/>
+              <a:rPr lang="en-US"/>
               <a:t>Click to edit Master text styles</a:t>
             </a:r>
           </a:p>
@@ -6015,7 +6149,7 @@
           <a:p>
             <a:fld id="{A5E07225-8B6E-4997-B967-5103AD87EC84}" type="datetimeFigureOut">
               <a:rPr lang="en-US" smtClean="0"/>
-              <a:t>3/15/2017</a:t>
+              <a:t>3/16/2017</a:t>
             </a:fld>
             <a:endParaRPr lang="en-US"/>
           </a:p>
@@ -6113,7 +6247,7 @@
           </a:lstStyle>
           <a:p>
             <a:r>
-              <a:rPr lang="en-US" smtClean="0"/>
+              <a:rPr lang="en-US"/>
               <a:t>Click to edit Master title style</a:t>
             </a:r>
             <a:endParaRPr lang="en-US" dirty="0"/>
@@ -6188,7 +6322,7 @@
           <a:p>
             <a:pPr lvl="0"/>
             <a:r>
-              <a:rPr lang="en-US" smtClean="0"/>
+              <a:rPr lang="en-US"/>
               <a:t>Click to edit Master text styles</a:t>
             </a:r>
           </a:p>
@@ -6266,7 +6400,7 @@
           </a:lstStyle>
           <a:p>
             <a:r>
-              <a:rPr lang="en-US" smtClean="0"/>
+              <a:rPr lang="en-US"/>
               <a:t>Click icon to add picture</a:t>
             </a:r>
             <a:endParaRPr lang="en-US" dirty="0"/>
@@ -6334,7 +6468,7 @@
           <a:p>
             <a:pPr lvl="0"/>
             <a:r>
-              <a:rPr lang="en-US" smtClean="0"/>
+              <a:rPr lang="en-US"/>
               <a:t>Click to edit Master text styles</a:t>
             </a:r>
           </a:p>
@@ -6408,7 +6542,7 @@
           <a:p>
             <a:pPr lvl="0"/>
             <a:r>
-              <a:rPr lang="en-US" smtClean="0"/>
+              <a:rPr lang="en-US"/>
               <a:t>Click to edit Master text styles</a:t>
             </a:r>
           </a:p>
@@ -6486,7 +6620,7 @@
           </a:lstStyle>
           <a:p>
             <a:r>
-              <a:rPr lang="en-US" smtClean="0"/>
+              <a:rPr lang="en-US"/>
               <a:t>Click icon to add picture</a:t>
             </a:r>
             <a:endParaRPr lang="en-US" dirty="0"/>
@@ -6554,7 +6688,7 @@
           <a:p>
             <a:pPr lvl="0"/>
             <a:r>
-              <a:rPr lang="en-US" smtClean="0"/>
+              <a:rPr lang="en-US"/>
               <a:t>Click to edit Master text styles</a:t>
             </a:r>
           </a:p>
@@ -6628,7 +6762,7 @@
           <a:p>
             <a:pPr lvl="0"/>
             <a:r>
-              <a:rPr lang="en-US" smtClean="0"/>
+              <a:rPr lang="en-US"/>
               <a:t>Click to edit Master text styles</a:t>
             </a:r>
           </a:p>
@@ -6706,7 +6840,7 @@
           </a:lstStyle>
           <a:p>
             <a:r>
-              <a:rPr lang="en-US" smtClean="0"/>
+              <a:rPr lang="en-US"/>
               <a:t>Click icon to add picture</a:t>
             </a:r>
             <a:endParaRPr lang="en-US" dirty="0"/>
@@ -6774,7 +6908,7 @@
           <a:p>
             <a:pPr lvl="0"/>
             <a:r>
-              <a:rPr lang="en-US" smtClean="0"/>
+              <a:rPr lang="en-US"/>
               <a:t>Click to edit Master text styles</a:t>
             </a:r>
           </a:p>
@@ -6875,7 +7009,7 @@
           <a:p>
             <a:fld id="{A5E07225-8B6E-4997-B967-5103AD87EC84}" type="datetimeFigureOut">
               <a:rPr lang="en-US" smtClean="0"/>
-              <a:t>3/15/2017</a:t>
+              <a:t>3/16/2017</a:t>
             </a:fld>
             <a:endParaRPr lang="en-US"/>
           </a:p>
@@ -6969,7 +7103,7 @@
           <a:lstStyle/>
           <a:p>
             <a:r>
-              <a:rPr lang="en-US" smtClean="0"/>
+              <a:rPr lang="en-US"/>
               <a:t>Click to edit Master title style</a:t>
             </a:r>
             <a:endParaRPr lang="en-US" dirty="0"/>
@@ -6993,35 +7127,35 @@
           <a:p>
             <a:pPr lvl="0"/>
             <a:r>
-              <a:rPr lang="en-US" smtClean="0"/>
+              <a:rPr lang="en-US"/>
               <a:t>Click to edit Master text styles</a:t>
             </a:r>
           </a:p>
           <a:p>
             <a:pPr lvl="1"/>
             <a:r>
-              <a:rPr lang="en-US" smtClean="0"/>
+              <a:rPr lang="en-US"/>
               <a:t>Second level</a:t>
             </a:r>
           </a:p>
           <a:p>
             <a:pPr lvl="2"/>
             <a:r>
-              <a:rPr lang="en-US" smtClean="0"/>
+              <a:rPr lang="en-US"/>
               <a:t>Third level</a:t>
             </a:r>
           </a:p>
           <a:p>
             <a:pPr lvl="3"/>
             <a:r>
-              <a:rPr lang="en-US" smtClean="0"/>
+              <a:rPr lang="en-US"/>
               <a:t>Fourth level</a:t>
             </a:r>
           </a:p>
           <a:p>
             <a:pPr lvl="4"/>
             <a:r>
-              <a:rPr lang="en-US" smtClean="0"/>
+              <a:rPr lang="en-US"/>
               <a:t>Fifth level</a:t>
             </a:r>
             <a:endParaRPr lang="en-US" dirty="0"/>
@@ -7045,7 +7179,7 @@
           <a:p>
             <a:fld id="{A5E07225-8B6E-4997-B967-5103AD87EC84}" type="datetimeFigureOut">
               <a:rPr lang="en-US" smtClean="0"/>
-              <a:t>3/15/2017</a:t>
+              <a:t>3/16/2017</a:t>
             </a:fld>
             <a:endParaRPr lang="en-US"/>
           </a:p>
@@ -7144,7 +7278,7 @@
           <a:lstStyle/>
           <a:p>
             <a:r>
-              <a:rPr lang="en-US" smtClean="0"/>
+              <a:rPr lang="en-US"/>
               <a:t>Click to edit Master title style</a:t>
             </a:r>
             <a:endParaRPr lang="en-US" dirty="0"/>
@@ -7173,35 +7307,35 @@
           <a:p>
             <a:pPr lvl="0"/>
             <a:r>
-              <a:rPr lang="en-US" smtClean="0"/>
+              <a:rPr lang="en-US"/>
               <a:t>Click to edit Master text styles</a:t>
             </a:r>
           </a:p>
           <a:p>
             <a:pPr lvl="1"/>
             <a:r>
-              <a:rPr lang="en-US" smtClean="0"/>
+              <a:rPr lang="en-US"/>
               <a:t>Second level</a:t>
             </a:r>
           </a:p>
           <a:p>
             <a:pPr lvl="2"/>
             <a:r>
-              <a:rPr lang="en-US" smtClean="0"/>
+              <a:rPr lang="en-US"/>
               <a:t>Third level</a:t>
             </a:r>
           </a:p>
           <a:p>
             <a:pPr lvl="3"/>
             <a:r>
-              <a:rPr lang="en-US" smtClean="0"/>
+              <a:rPr lang="en-US"/>
               <a:t>Fourth level</a:t>
             </a:r>
           </a:p>
           <a:p>
             <a:pPr lvl="4"/>
             <a:r>
-              <a:rPr lang="en-US" smtClean="0"/>
+              <a:rPr lang="en-US"/>
               <a:t>Fifth level</a:t>
             </a:r>
             <a:endParaRPr lang="en-US" dirty="0"/>
@@ -7225,7 +7359,7 @@
           <a:p>
             <a:fld id="{A5E07225-8B6E-4997-B967-5103AD87EC84}" type="datetimeFigureOut">
               <a:rPr lang="en-US" smtClean="0"/>
-              <a:t>3/15/2017</a:t>
+              <a:t>3/16/2017</a:t>
             </a:fld>
             <a:endParaRPr lang="en-US"/>
           </a:p>
@@ -7324,7 +7458,7 @@
           <a:lstStyle/>
           <a:p>
             <a:r>
-              <a:rPr lang="en-US" smtClean="0"/>
+              <a:rPr lang="en-US"/>
               <a:t>Click to edit Master title style</a:t>
             </a:r>
             <a:endParaRPr lang="en-US" dirty="0"/>
@@ -7353,38 +7487,37 @@
           <a:p>
             <a:pPr lvl="0"/>
             <a:r>
-              <a:rPr lang="en-US" dirty="0" smtClean="0"/>
+              <a:rPr lang="en-US" dirty="0"/>
               <a:t>Click to edit Master text styles</a:t>
             </a:r>
           </a:p>
           <a:p>
             <a:pPr lvl="1"/>
             <a:r>
-              <a:rPr lang="en-US" dirty="0" smtClean="0"/>
+              <a:rPr lang="en-US" dirty="0"/>
               <a:t>Second level</a:t>
             </a:r>
           </a:p>
           <a:p>
             <a:pPr lvl="2"/>
             <a:r>
-              <a:rPr lang="en-US" dirty="0" smtClean="0"/>
+              <a:rPr lang="en-US" dirty="0"/>
               <a:t>Third level</a:t>
             </a:r>
           </a:p>
           <a:p>
             <a:pPr lvl="3"/>
             <a:r>
-              <a:rPr lang="en-US" dirty="0" smtClean="0"/>
+              <a:rPr lang="en-US" dirty="0"/>
               <a:t>Fourth level</a:t>
             </a:r>
           </a:p>
           <a:p>
             <a:pPr lvl="4"/>
             <a:r>
-              <a:rPr lang="en-US" dirty="0" smtClean="0"/>
+              <a:rPr lang="en-US" dirty="0"/>
               <a:t>Fifth level</a:t>
             </a:r>
-            <a:endParaRPr lang="en-US" dirty="0"/>
           </a:p>
         </p:txBody>
       </p:sp>
@@ -7405,7 +7538,7 @@
           <a:p>
             <a:fld id="{A5E07225-8B6E-4997-B967-5103AD87EC84}" type="datetimeFigureOut">
               <a:rPr lang="en-US" smtClean="0"/>
-              <a:t>3/15/2017</a:t>
+              <a:t>3/16/2017</a:t>
             </a:fld>
             <a:endParaRPr lang="en-US"/>
           </a:p>
@@ -7508,7 +7641,7 @@
           </a:lstStyle>
           <a:p>
             <a:r>
-              <a:rPr lang="en-US" smtClean="0"/>
+              <a:rPr lang="en-US"/>
               <a:t>Click to edit Master title style</a:t>
             </a:r>
             <a:endParaRPr lang="en-US" dirty="0"/>
@@ -7629,7 +7762,7 @@
           <a:p>
             <a:pPr lvl="0"/>
             <a:r>
-              <a:rPr lang="en-US" smtClean="0"/>
+              <a:rPr lang="en-US"/>
               <a:t>Click to edit Master text styles</a:t>
             </a:r>
           </a:p>
@@ -7652,7 +7785,7 @@
           <a:p>
             <a:fld id="{A5E07225-8B6E-4997-B967-5103AD87EC84}" type="datetimeFigureOut">
               <a:rPr lang="en-US" smtClean="0"/>
-              <a:t>3/15/2017</a:t>
+              <a:t>3/16/2017</a:t>
             </a:fld>
             <a:endParaRPr lang="en-US"/>
           </a:p>
@@ -7746,7 +7879,7 @@
           <a:lstStyle/>
           <a:p>
             <a:r>
-              <a:rPr lang="en-US" smtClean="0"/>
+              <a:rPr lang="en-US"/>
               <a:t>Click to edit Master title style</a:t>
             </a:r>
             <a:endParaRPr lang="en-US" dirty="0"/>
@@ -7805,35 +7938,35 @@
           <a:p>
             <a:pPr lvl="0"/>
             <a:r>
-              <a:rPr lang="en-US" smtClean="0"/>
+              <a:rPr lang="en-US"/>
               <a:t>Click to edit Master text styles</a:t>
             </a:r>
           </a:p>
           <a:p>
             <a:pPr lvl="1"/>
             <a:r>
-              <a:rPr lang="en-US" smtClean="0"/>
+              <a:rPr lang="en-US"/>
               <a:t>Second level</a:t>
             </a:r>
           </a:p>
           <a:p>
             <a:pPr lvl="2"/>
             <a:r>
-              <a:rPr lang="en-US" smtClean="0"/>
+              <a:rPr lang="en-US"/>
               <a:t>Third level</a:t>
             </a:r>
           </a:p>
           <a:p>
             <a:pPr lvl="3"/>
             <a:r>
-              <a:rPr lang="en-US" smtClean="0"/>
+              <a:rPr lang="en-US"/>
               <a:t>Fourth level</a:t>
             </a:r>
           </a:p>
           <a:p>
             <a:pPr lvl="4"/>
             <a:r>
-              <a:rPr lang="en-US" smtClean="0"/>
+              <a:rPr lang="en-US"/>
               <a:t>Fifth level</a:t>
             </a:r>
             <a:endParaRPr lang="en-US" dirty="0"/>
@@ -7892,35 +8025,35 @@
           <a:p>
             <a:pPr lvl="0"/>
             <a:r>
-              <a:rPr lang="en-US" smtClean="0"/>
+              <a:rPr lang="en-US"/>
               <a:t>Click to edit Master text styles</a:t>
             </a:r>
           </a:p>
           <a:p>
             <a:pPr lvl="1"/>
             <a:r>
-              <a:rPr lang="en-US" smtClean="0"/>
+              <a:rPr lang="en-US"/>
               <a:t>Second level</a:t>
             </a:r>
           </a:p>
           <a:p>
             <a:pPr lvl="2"/>
             <a:r>
-              <a:rPr lang="en-US" smtClean="0"/>
+              <a:rPr lang="en-US"/>
               <a:t>Third level</a:t>
             </a:r>
           </a:p>
           <a:p>
             <a:pPr lvl="3"/>
             <a:r>
-              <a:rPr lang="en-US" smtClean="0"/>
+              <a:rPr lang="en-US"/>
               <a:t>Fourth level</a:t>
             </a:r>
           </a:p>
           <a:p>
             <a:pPr lvl="4"/>
             <a:r>
-              <a:rPr lang="en-US" smtClean="0"/>
+              <a:rPr lang="en-US"/>
               <a:t>Fifth level</a:t>
             </a:r>
             <a:endParaRPr lang="en-US" dirty="0"/>
@@ -7944,7 +8077,7 @@
           <a:p>
             <a:fld id="{A5E07225-8B6E-4997-B967-5103AD87EC84}" type="datetimeFigureOut">
               <a:rPr lang="en-US" smtClean="0"/>
-              <a:t>3/15/2017</a:t>
+              <a:t>3/16/2017</a:t>
             </a:fld>
             <a:endParaRPr lang="en-US"/>
           </a:p>
@@ -8042,7 +8175,7 @@
           </a:lstStyle>
           <a:p>
             <a:r>
-              <a:rPr lang="en-US" smtClean="0"/>
+              <a:rPr lang="en-US"/>
               <a:t>Click to edit Master title style</a:t>
             </a:r>
             <a:endParaRPr lang="en-US" dirty="0"/>
@@ -8117,7 +8250,7 @@
           <a:p>
             <a:pPr lvl="0"/>
             <a:r>
-              <a:rPr lang="en-US" smtClean="0"/>
+              <a:rPr lang="en-US"/>
               <a:t>Click to edit Master text styles</a:t>
             </a:r>
           </a:p>
@@ -8175,35 +8308,35 @@
           <a:p>
             <a:pPr lvl="0"/>
             <a:r>
-              <a:rPr lang="en-US" smtClean="0"/>
+              <a:rPr lang="en-US"/>
               <a:t>Click to edit Master text styles</a:t>
             </a:r>
           </a:p>
           <a:p>
             <a:pPr lvl="1"/>
             <a:r>
-              <a:rPr lang="en-US" smtClean="0"/>
+              <a:rPr lang="en-US"/>
               <a:t>Second level</a:t>
             </a:r>
           </a:p>
           <a:p>
             <a:pPr lvl="2"/>
             <a:r>
-              <a:rPr lang="en-US" smtClean="0"/>
+              <a:rPr lang="en-US"/>
               <a:t>Third level</a:t>
             </a:r>
           </a:p>
           <a:p>
             <a:pPr lvl="3"/>
             <a:r>
-              <a:rPr lang="en-US" smtClean="0"/>
+              <a:rPr lang="en-US"/>
               <a:t>Fourth level</a:t>
             </a:r>
           </a:p>
           <a:p>
             <a:pPr lvl="4"/>
             <a:r>
-              <a:rPr lang="en-US" smtClean="0"/>
+              <a:rPr lang="en-US"/>
               <a:t>Fifth level</a:t>
             </a:r>
             <a:endParaRPr lang="en-US" dirty="0"/>
@@ -8278,7 +8411,7 @@
           <a:p>
             <a:pPr lvl="0"/>
             <a:r>
-              <a:rPr lang="en-US" smtClean="0"/>
+              <a:rPr lang="en-US"/>
               <a:t>Click to edit Master text styles</a:t>
             </a:r>
           </a:p>
@@ -8336,35 +8469,35 @@
           <a:p>
             <a:pPr lvl="0"/>
             <a:r>
-              <a:rPr lang="en-US" smtClean="0"/>
+              <a:rPr lang="en-US"/>
               <a:t>Click to edit Master text styles</a:t>
             </a:r>
           </a:p>
           <a:p>
             <a:pPr lvl="1"/>
             <a:r>
-              <a:rPr lang="en-US" smtClean="0"/>
+              <a:rPr lang="en-US"/>
               <a:t>Second level</a:t>
             </a:r>
           </a:p>
           <a:p>
             <a:pPr lvl="2"/>
             <a:r>
-              <a:rPr lang="en-US" smtClean="0"/>
+              <a:rPr lang="en-US"/>
               <a:t>Third level</a:t>
             </a:r>
           </a:p>
           <a:p>
             <a:pPr lvl="3"/>
             <a:r>
-              <a:rPr lang="en-US" smtClean="0"/>
+              <a:rPr lang="en-US"/>
               <a:t>Fourth level</a:t>
             </a:r>
           </a:p>
           <a:p>
             <a:pPr lvl="4"/>
             <a:r>
-              <a:rPr lang="en-US" smtClean="0"/>
+              <a:rPr lang="en-US"/>
               <a:t>Fifth level</a:t>
             </a:r>
             <a:endParaRPr lang="en-US" dirty="0"/>
@@ -8388,7 +8521,7 @@
           <a:p>
             <a:fld id="{A5E07225-8B6E-4997-B967-5103AD87EC84}" type="datetimeFigureOut">
               <a:rPr lang="en-US" smtClean="0"/>
-              <a:t>3/15/2017</a:t>
+              <a:t>3/16/2017</a:t>
             </a:fld>
             <a:endParaRPr lang="en-US"/>
           </a:p>
@@ -8482,7 +8615,7 @@
           <a:lstStyle/>
           <a:p>
             <a:r>
-              <a:rPr lang="en-US" smtClean="0"/>
+              <a:rPr lang="en-US"/>
               <a:t>Click to edit Master title style</a:t>
             </a:r>
             <a:endParaRPr lang="en-US" dirty="0"/>
@@ -8506,7 +8639,7 @@
           <a:p>
             <a:fld id="{A5E07225-8B6E-4997-B967-5103AD87EC84}" type="datetimeFigureOut">
               <a:rPr lang="en-US" smtClean="0"/>
-              <a:t>3/15/2017</a:t>
+              <a:t>3/16/2017</a:t>
             </a:fld>
             <a:endParaRPr lang="en-US"/>
           </a:p>
@@ -8601,7 +8734,7 @@
           <a:p>
             <a:fld id="{A5E07225-8B6E-4997-B967-5103AD87EC84}" type="datetimeFigureOut">
               <a:rPr lang="en-US" smtClean="0"/>
-              <a:t>3/15/2017</a:t>
+              <a:t>3/16/2017</a:t>
             </a:fld>
             <a:endParaRPr lang="en-US"/>
           </a:p>
@@ -8704,7 +8837,7 @@
           </a:lstStyle>
           <a:p>
             <a:r>
-              <a:rPr lang="en-US" smtClean="0"/>
+              <a:rPr lang="en-US"/>
               <a:t>Click to edit Master title style</a:t>
             </a:r>
             <a:endParaRPr lang="en-US" dirty="0"/>
@@ -8763,35 +8896,35 @@
           <a:p>
             <a:pPr lvl="0"/>
             <a:r>
-              <a:rPr lang="en-US" smtClean="0"/>
+              <a:rPr lang="en-US"/>
               <a:t>Click to edit Master text styles</a:t>
             </a:r>
           </a:p>
           <a:p>
             <a:pPr lvl="1"/>
             <a:r>
-              <a:rPr lang="en-US" smtClean="0"/>
+              <a:rPr lang="en-US"/>
               <a:t>Second level</a:t>
             </a:r>
           </a:p>
           <a:p>
             <a:pPr lvl="2"/>
             <a:r>
-              <a:rPr lang="en-US" smtClean="0"/>
+              <a:rPr lang="en-US"/>
               <a:t>Third level</a:t>
             </a:r>
           </a:p>
           <a:p>
             <a:pPr lvl="3"/>
             <a:r>
-              <a:rPr lang="en-US" smtClean="0"/>
+              <a:rPr lang="en-US"/>
               <a:t>Fourth level</a:t>
             </a:r>
           </a:p>
           <a:p>
             <a:pPr lvl="4"/>
             <a:r>
-              <a:rPr lang="en-US" smtClean="0"/>
+              <a:rPr lang="en-US"/>
               <a:t>Fifth level</a:t>
             </a:r>
             <a:endParaRPr lang="en-US" dirty="0"/>
@@ -8857,7 +8990,7 @@
           <a:p>
             <a:pPr lvl="0"/>
             <a:r>
-              <a:rPr lang="en-US" smtClean="0"/>
+              <a:rPr lang="en-US"/>
               <a:t>Click to edit Master text styles</a:t>
             </a:r>
           </a:p>
@@ -8880,7 +9013,7 @@
           <a:p>
             <a:fld id="{A5E07225-8B6E-4997-B967-5103AD87EC84}" type="datetimeFigureOut">
               <a:rPr lang="en-US" smtClean="0"/>
-              <a:t>3/15/2017</a:t>
+              <a:t>3/16/2017</a:t>
             </a:fld>
             <a:endParaRPr lang="en-US"/>
           </a:p>
@@ -8985,7 +9118,7 @@
           </a:lstStyle>
           <a:p>
             <a:r>
-              <a:rPr lang="en-US" smtClean="0"/>
+              <a:rPr lang="en-US"/>
               <a:t>Click to edit Master title style</a:t>
             </a:r>
             <a:endParaRPr lang="en-US" dirty="0"/>
@@ -9064,7 +9197,7 @@
           </a:lstStyle>
           <a:p>
             <a:r>
-              <a:rPr lang="en-US" smtClean="0"/>
+              <a:rPr lang="en-US"/>
               <a:t>Click icon to add picture</a:t>
             </a:r>
             <a:endParaRPr lang="en-US" dirty="0"/>
@@ -9132,7 +9265,7 @@
           <a:p>
             <a:pPr lvl="0"/>
             <a:r>
-              <a:rPr lang="en-US" smtClean="0"/>
+              <a:rPr lang="en-US"/>
               <a:t>Click to edit Master text styles</a:t>
             </a:r>
           </a:p>
@@ -9155,7 +9288,7 @@
           <a:p>
             <a:fld id="{A5E07225-8B6E-4997-B967-5103AD87EC84}" type="datetimeFigureOut">
               <a:rPr lang="en-US" smtClean="0"/>
-              <a:t>3/15/2017</a:t>
+              <a:t>3/16/2017</a:t>
             </a:fld>
             <a:endParaRPr lang="en-US"/>
           </a:p>
@@ -9479,7 +9612,7 @@
           <a:lstStyle/>
           <a:p>
             <a:r>
-              <a:rPr lang="en-US" smtClean="0"/>
+              <a:rPr lang="en-US"/>
               <a:t>Click to edit Master title style</a:t>
             </a:r>
             <a:endParaRPr lang="en-US" dirty="0"/>
@@ -9513,35 +9646,35 @@
           <a:p>
             <a:pPr lvl="0"/>
             <a:r>
-              <a:rPr lang="en-US" smtClean="0"/>
+              <a:rPr lang="en-US"/>
               <a:t>Click to edit Master text styles</a:t>
             </a:r>
           </a:p>
           <a:p>
             <a:pPr lvl="1"/>
             <a:r>
-              <a:rPr lang="en-US" smtClean="0"/>
+              <a:rPr lang="en-US"/>
               <a:t>Second level</a:t>
             </a:r>
           </a:p>
           <a:p>
             <a:pPr lvl="2"/>
             <a:r>
-              <a:rPr lang="en-US" smtClean="0"/>
+              <a:rPr lang="en-US"/>
               <a:t>Third level</a:t>
             </a:r>
           </a:p>
           <a:p>
             <a:pPr lvl="3"/>
             <a:r>
-              <a:rPr lang="en-US" smtClean="0"/>
+              <a:rPr lang="en-US"/>
               <a:t>Fourth level</a:t>
             </a:r>
           </a:p>
           <a:p>
             <a:pPr lvl="4"/>
             <a:r>
-              <a:rPr lang="en-US" smtClean="0"/>
+              <a:rPr lang="en-US"/>
               <a:t>Fifth level</a:t>
             </a:r>
             <a:endParaRPr lang="en-US" dirty="0"/>
@@ -9584,7 +9717,7 @@
           <a:p>
             <a:fld id="{A5E07225-8B6E-4997-B967-5103AD87EC84}" type="datetimeFigureOut">
               <a:rPr lang="en-US" smtClean="0"/>
-              <a:t>3/15/2017</a:t>
+              <a:t>3/16/2017</a:t>
             </a:fld>
             <a:endParaRPr lang="en-US"/>
           </a:p>
@@ -10133,10 +10266,9 @@
           <a:lstStyle/>
           <a:p>
             <a:r>
-              <a:rPr lang="en-US" sz="6800" dirty="0" smtClean="0"/>
+              <a:rPr lang="en-US" sz="6800" dirty="0"/>
               <a:t>Financial Data Analysis</a:t>
             </a:r>
-            <a:endParaRPr lang="en-US" sz="6800" dirty="0"/>
           </a:p>
         </p:txBody>
       </p:sp>
@@ -10156,10 +10288,9 @@
           <a:lstStyle/>
           <a:p>
             <a:r>
-              <a:rPr lang="en-US" dirty="0" smtClean="0"/>
+              <a:rPr lang="en-US" dirty="0"/>
               <a:t>Matthew Bates &amp; Sankeerti Haniyur</a:t>
             </a:r>
-            <a:endParaRPr lang="en-US" dirty="0"/>
           </a:p>
         </p:txBody>
       </p:sp>
@@ -10209,10 +10340,9 @@
           <a:lstStyle/>
           <a:p>
             <a:r>
-              <a:rPr lang="en-US" dirty="0" smtClean="0"/>
+              <a:rPr lang="en-US" dirty="0"/>
               <a:t>Introduction</a:t>
             </a:r>
-            <a:endParaRPr lang="en-US" dirty="0"/>
           </a:p>
         </p:txBody>
       </p:sp>
@@ -10266,12 +10396,8 @@
               <a:buNone/>
             </a:pPr>
             <a:r>
-              <a:rPr lang="en-US" sz="1200" dirty="0" smtClean="0"/>
-              <a:t>Source: </a:t>
-            </a:r>
-            <a:r>
               <a:rPr lang="en-US" sz="1200" dirty="0"/>
-              <a:t>"Quantifying Trading Behavior in Financial Markets Using Google Trends" by Tobias </a:t>
+              <a:t>Source: "Quantifying Trading Behavior in Financial Markets Using Google Trends" by Tobias </a:t>
             </a:r>
             <a:r>
               <a:rPr lang="en-US" sz="1200" dirty="0" err="1"/>
@@ -10281,7 +10407,6 @@
               <a:rPr lang="en-US" sz="1200" dirty="0"/>
               <a:t>, Helen Susannah Moat &amp; H. Eugene Stanley - </a:t>
             </a:r>
-            <a:endParaRPr lang="en-US" sz="1200" dirty="0"/>
           </a:p>
         </p:txBody>
       </p:sp>
@@ -10507,19 +10632,14 @@
           <a:p>
             <a:r>
               <a:rPr lang="en-US" dirty="0"/>
-              <a:t>Idea came </a:t>
-            </a:r>
-            <a:r>
-              <a:rPr lang="en-US" dirty="0" smtClean="0"/>
-              <a:t>from our mutual interest in financial analysis</a:t>
-            </a:r>
-          </a:p>
-          <a:p>
-            <a:r>
-              <a:rPr lang="en-US" dirty="0" smtClean="0"/>
-              <a:t>Read some reading a few research papers about predicting stock market trends using search engine data</a:t>
-            </a:r>
-            <a:endParaRPr lang="en-US" dirty="0"/>
+              <a:t>Idea came from our mutual interest in financial analysis</a:t>
+            </a:r>
+          </a:p>
+          <a:p>
+            <a:r>
+              <a:rPr lang="en-US" dirty="0"/>
+              <a:t>Read a few research papers about predicting stock market trends using search engine data</a:t>
+            </a:r>
           </a:p>
         </p:txBody>
       </p:sp>
@@ -10585,6 +10705,263 @@
           </a:p>
         </p:txBody>
       </p:sp>
+      <p:cxnSp>
+        <p:nvCxnSpPr>
+          <p:cNvPr id="8" name="Straight Connector 7"/>
+          <p:cNvCxnSpPr/>
+          <p:nvPr/>
+        </p:nvCxnSpPr>
+        <p:spPr>
+          <a:xfrm>
+            <a:off x="8465127" y="1471906"/>
+            <a:ext cx="1330037" cy="0"/>
+          </a:xfrm>
+          <a:prstGeom prst="line">
+            <a:avLst/>
+          </a:prstGeom>
+          <a:ln w="25400">
+            <a:solidFill>
+              <a:srgbClr val="FF0000"/>
+            </a:solidFill>
+          </a:ln>
+        </p:spPr>
+        <p:style>
+          <a:lnRef idx="1">
+            <a:schemeClr val="accent1"/>
+          </a:lnRef>
+          <a:fillRef idx="0">
+            <a:schemeClr val="accent1"/>
+          </a:fillRef>
+          <a:effectRef idx="0">
+            <a:schemeClr val="accent1"/>
+          </a:effectRef>
+          <a:fontRef idx="minor">
+            <a:schemeClr val="tx1"/>
+          </a:fontRef>
+        </p:style>
+      </p:cxnSp>
+      <p:cxnSp>
+        <p:nvCxnSpPr>
+          <p:cNvPr id="11" name="Straight Connector 10"/>
+          <p:cNvCxnSpPr>
+            <a:cxnSpLocks/>
+          </p:cNvCxnSpPr>
+          <p:nvPr/>
+        </p:nvCxnSpPr>
+        <p:spPr>
+          <a:xfrm flipV="1">
+            <a:off x="6982691" y="1995054"/>
+            <a:ext cx="4391891" cy="3325"/>
+          </a:xfrm>
+          <a:prstGeom prst="line">
+            <a:avLst/>
+          </a:prstGeom>
+          <a:ln w="25400">
+            <a:solidFill>
+              <a:srgbClr val="FF0000"/>
+            </a:solidFill>
+          </a:ln>
+        </p:spPr>
+        <p:style>
+          <a:lnRef idx="1">
+            <a:schemeClr val="accent1"/>
+          </a:lnRef>
+          <a:fillRef idx="0">
+            <a:schemeClr val="accent1"/>
+          </a:fillRef>
+          <a:effectRef idx="0">
+            <a:schemeClr val="accent1"/>
+          </a:effectRef>
+          <a:fontRef idx="minor">
+            <a:schemeClr val="tx1"/>
+          </a:fontRef>
+        </p:style>
+      </p:cxnSp>
+      <p:cxnSp>
+        <p:nvCxnSpPr>
+          <p:cNvPr id="12" name="Straight Connector 11"/>
+          <p:cNvCxnSpPr>
+            <a:cxnSpLocks/>
+          </p:cNvCxnSpPr>
+          <p:nvPr/>
+        </p:nvCxnSpPr>
+        <p:spPr>
+          <a:xfrm flipV="1">
+            <a:off x="6885709" y="2521527"/>
+            <a:ext cx="1454727" cy="3325"/>
+          </a:xfrm>
+          <a:prstGeom prst="line">
+            <a:avLst/>
+          </a:prstGeom>
+          <a:ln w="25400">
+            <a:solidFill>
+              <a:srgbClr val="FF0000"/>
+            </a:solidFill>
+          </a:ln>
+        </p:spPr>
+        <p:style>
+          <a:lnRef idx="1">
+            <a:schemeClr val="accent1"/>
+          </a:lnRef>
+          <a:fillRef idx="0">
+            <a:schemeClr val="accent1"/>
+          </a:fillRef>
+          <a:effectRef idx="0">
+            <a:schemeClr val="accent1"/>
+          </a:effectRef>
+          <a:fontRef idx="minor">
+            <a:schemeClr val="tx1"/>
+          </a:fontRef>
+        </p:style>
+      </p:cxnSp>
+      <p:cxnSp>
+        <p:nvCxnSpPr>
+          <p:cNvPr id="14" name="Straight Connector 13"/>
+          <p:cNvCxnSpPr>
+            <a:cxnSpLocks/>
+          </p:cNvCxnSpPr>
+          <p:nvPr/>
+        </p:nvCxnSpPr>
+        <p:spPr>
+          <a:xfrm>
+            <a:off x="10238509" y="2521527"/>
+            <a:ext cx="1011382" cy="3325"/>
+          </a:xfrm>
+          <a:prstGeom prst="line">
+            <a:avLst/>
+          </a:prstGeom>
+          <a:ln w="25400">
+            <a:solidFill>
+              <a:srgbClr val="FF0000"/>
+            </a:solidFill>
+          </a:ln>
+        </p:spPr>
+        <p:style>
+          <a:lnRef idx="1">
+            <a:schemeClr val="accent1"/>
+          </a:lnRef>
+          <a:fillRef idx="0">
+            <a:schemeClr val="accent1"/>
+          </a:fillRef>
+          <a:effectRef idx="0">
+            <a:schemeClr val="accent1"/>
+          </a:effectRef>
+          <a:fontRef idx="minor">
+            <a:schemeClr val="tx1"/>
+          </a:fontRef>
+        </p:style>
+      </p:cxnSp>
+      <p:cxnSp>
+        <p:nvCxnSpPr>
+          <p:cNvPr id="16" name="Straight Connector 15"/>
+          <p:cNvCxnSpPr>
+            <a:cxnSpLocks/>
+          </p:cNvCxnSpPr>
+          <p:nvPr/>
+        </p:nvCxnSpPr>
+        <p:spPr>
+          <a:xfrm flipV="1">
+            <a:off x="6525490" y="2798618"/>
+            <a:ext cx="3865419" cy="3326"/>
+          </a:xfrm>
+          <a:prstGeom prst="line">
+            <a:avLst/>
+          </a:prstGeom>
+          <a:ln w="25400">
+            <a:solidFill>
+              <a:srgbClr val="FF0000"/>
+            </a:solidFill>
+          </a:ln>
+        </p:spPr>
+        <p:style>
+          <a:lnRef idx="1">
+            <a:schemeClr val="accent1"/>
+          </a:lnRef>
+          <a:fillRef idx="0">
+            <a:schemeClr val="accent1"/>
+          </a:fillRef>
+          <a:effectRef idx="0">
+            <a:schemeClr val="accent1"/>
+          </a:effectRef>
+          <a:fontRef idx="minor">
+            <a:schemeClr val="tx1"/>
+          </a:fontRef>
+        </p:style>
+      </p:cxnSp>
+      <p:cxnSp>
+        <p:nvCxnSpPr>
+          <p:cNvPr id="24" name="Straight Connector 23"/>
+          <p:cNvCxnSpPr>
+            <a:cxnSpLocks/>
+          </p:cNvCxnSpPr>
+          <p:nvPr/>
+        </p:nvCxnSpPr>
+        <p:spPr>
+          <a:xfrm>
+            <a:off x="8575962" y="2844855"/>
+            <a:ext cx="512618" cy="10530"/>
+          </a:xfrm>
+          <a:prstGeom prst="line">
+            <a:avLst/>
+          </a:prstGeom>
+          <a:ln w="25400">
+            <a:solidFill>
+              <a:srgbClr val="FF0000"/>
+            </a:solidFill>
+          </a:ln>
+        </p:spPr>
+        <p:style>
+          <a:lnRef idx="1">
+            <a:schemeClr val="accent1"/>
+          </a:lnRef>
+          <a:fillRef idx="0">
+            <a:schemeClr val="accent1"/>
+          </a:fillRef>
+          <a:effectRef idx="0">
+            <a:schemeClr val="accent1"/>
+          </a:effectRef>
+          <a:fontRef idx="minor">
+            <a:schemeClr val="tx1"/>
+          </a:fontRef>
+        </p:style>
+      </p:cxnSp>
+      <p:cxnSp>
+        <p:nvCxnSpPr>
+          <p:cNvPr id="26" name="Straight Connector 25"/>
+          <p:cNvCxnSpPr>
+            <a:cxnSpLocks/>
+          </p:cNvCxnSpPr>
+          <p:nvPr/>
+        </p:nvCxnSpPr>
+        <p:spPr>
+          <a:xfrm>
+            <a:off x="8562102" y="2886415"/>
+            <a:ext cx="512618" cy="10530"/>
+          </a:xfrm>
+          <a:prstGeom prst="line">
+            <a:avLst/>
+          </a:prstGeom>
+          <a:ln w="25400">
+            <a:solidFill>
+              <a:srgbClr val="FF0000"/>
+            </a:solidFill>
+          </a:ln>
+        </p:spPr>
+        <p:style>
+          <a:lnRef idx="1">
+            <a:schemeClr val="accent1"/>
+          </a:lnRef>
+          <a:fillRef idx="0">
+            <a:schemeClr val="accent1"/>
+          </a:fillRef>
+          <a:effectRef idx="0">
+            <a:schemeClr val="accent1"/>
+          </a:effectRef>
+          <a:fontRef idx="minor">
+            <a:schemeClr val="tx1"/>
+          </a:fontRef>
+        </p:style>
+      </p:cxnSp>
     </p:spTree>
     <p:extLst>
       <p:ext uri="{BB962C8B-B14F-4D97-AF65-F5344CB8AC3E}">
@@ -10631,10 +11008,9 @@
           <a:lstStyle/>
           <a:p>
             <a:r>
-              <a:rPr lang="en-US" dirty="0" smtClean="0"/>
+              <a:rPr lang="en-US" dirty="0"/>
               <a:t>Methodology</a:t>
             </a:r>
-            <a:endParaRPr lang="en-US" dirty="0"/>
           </a:p>
         </p:txBody>
       </p:sp>
@@ -10648,7 +11024,7 @@
             <p:ph idx="1"/>
             <p:extLst>
               <p:ext uri="{D42A27DB-BD31-4B8C-83A1-F6EECF244321}">
-                <p14:modId xmlns:p14="http://schemas.microsoft.com/office/powerpoint/2010/main" val="4199931896"/>
+                <p14:modId xmlns:p14="http://schemas.microsoft.com/office/powerpoint/2010/main" val="597967955"/>
               </p:ext>
             </p:extLst>
           </p:nvPr>
@@ -10709,14 +11085,9 @@
           <a:lstStyle/>
           <a:p>
             <a:r>
-              <a:rPr lang="en-US" dirty="0" smtClean="0"/>
-              <a:t>Data</a:t>
-            </a:r>
-            <a:r>
-              <a:rPr lang="en-US" dirty="0" smtClean="0"/>
-              <a:t>: Google Trends</a:t>
-            </a:r>
-            <a:endParaRPr lang="en-US" dirty="0"/>
+              <a:rPr lang="en-US" dirty="0"/>
+              <a:t>Data: Google Trends</a:t>
+            </a:r>
           </a:p>
         </p:txBody>
       </p:sp>
@@ -10741,21 +11112,20 @@
           <a:lstStyle/>
           <a:p>
             <a:r>
-              <a:rPr lang="en-US" dirty="0" smtClean="0"/>
+              <a:rPr lang="en-US" dirty="0"/>
               <a:t>Used an unofficial API – </a:t>
             </a:r>
             <a:r>
-              <a:rPr lang="en-US" dirty="0" err="1" smtClean="0"/>
+              <a:rPr lang="en-US" dirty="0" err="1"/>
               <a:t>pytrends</a:t>
             </a:r>
-            <a:endParaRPr lang="en-US" dirty="0" smtClean="0"/>
-          </a:p>
-          <a:p>
-            <a:r>
-              <a:rPr lang="en-US" dirty="0" smtClean="0"/>
+            <a:endParaRPr lang="en-US" dirty="0"/>
+          </a:p>
+          <a:p>
+            <a:r>
+              <a:rPr lang="en-US" dirty="0"/>
               <a:t>Initially observed weekly pattern in data</a:t>
             </a:r>
-            <a:endParaRPr lang="en-US" dirty="0"/>
           </a:p>
         </p:txBody>
       </p:sp>
@@ -10853,10 +11223,9 @@
           <a:lstStyle/>
           <a:p>
             <a:r>
-              <a:rPr lang="en-US" dirty="0" smtClean="0"/>
+              <a:rPr lang="en-US" dirty="0"/>
               <a:t>Data: Google Trends</a:t>
             </a:r>
-            <a:endParaRPr lang="en-US" dirty="0"/>
           </a:p>
         </p:txBody>
       </p:sp>
@@ -10873,21 +11242,27 @@
         <p:spPr>
           <a:xfrm>
             <a:off x="646111" y="1447801"/>
-            <a:ext cx="9494585" cy="1633727"/>
+            <a:ext cx="9980325" cy="1989247"/>
           </a:xfrm>
         </p:spPr>
         <p:txBody>
           <a:bodyPr>
-            <a:normAutofit lnSpcReduction="10000"/>
+            <a:normAutofit fontScale="92500" lnSpcReduction="10000"/>
           </a:bodyPr>
           <a:lstStyle/>
           <a:p>
             <a:r>
-              <a:rPr lang="en-US" dirty="0" smtClean="0"/>
-              <a:t>Decided to just focus on one company: </a:t>
-            </a:r>
-            <a:r>
-              <a:rPr lang="en-US" b="1" dirty="0" smtClean="0"/>
+              <a:rPr lang="en-US" dirty="0"/>
+              <a:t>Use weekly data to smooth over weekday vs weekend search frequency spikes.</a:t>
+            </a:r>
+          </a:p>
+          <a:p>
+            <a:r>
+              <a:rPr lang="en-US" dirty="0"/>
+              <a:t>Decided to focus on one company for demonstration: </a:t>
+            </a:r>
+            <a:r>
+              <a:rPr lang="en-US" b="1" dirty="0"/>
               <a:t>Coca-Cola</a:t>
             </a:r>
           </a:p>
@@ -10897,30 +11272,29 @@
               <a:buChar char="v"/>
             </a:pPr>
             <a:r>
-              <a:rPr lang="en-US" dirty="0" smtClean="0"/>
+              <a:rPr lang="en-US" dirty="0"/>
               <a:t>Search terms: </a:t>
             </a:r>
             <a:r>
-              <a:rPr lang="en-US" dirty="0" err="1" smtClean="0"/>
+              <a:rPr lang="en-US" dirty="0" err="1"/>
               <a:t>coca-cola</a:t>
             </a:r>
             <a:r>
-              <a:rPr lang="en-US" dirty="0" smtClean="0"/>
+              <a:rPr lang="en-US" dirty="0"/>
               <a:t>, coca cola, KO, coke</a:t>
             </a:r>
           </a:p>
           <a:p>
             <a:r>
-              <a:rPr lang="en-US" dirty="0" smtClean="0"/>
+              <a:rPr lang="en-US" dirty="0"/>
               <a:t>Obtained weekly results per term for last 3 years</a:t>
             </a:r>
           </a:p>
           <a:p>
             <a:r>
-              <a:rPr lang="en-US" dirty="0" smtClean="0"/>
-              <a:t>3 categories of focus: Financial, Business &amp; Industrial, and News</a:t>
-            </a:r>
-            <a:endParaRPr lang="en-US" dirty="0"/>
+              <a:rPr lang="en-US" dirty="0"/>
+              <a:t>3 search-term categories of focus: Financial, Business &amp; Industrial, News</a:t>
+            </a:r>
           </a:p>
         </p:txBody>
       </p:sp>
@@ -10940,8 +11314,8 @@
         </p:blipFill>
         <p:spPr>
           <a:xfrm>
-            <a:off x="1203895" y="3200400"/>
-            <a:ext cx="4620833" cy="3416116"/>
+            <a:off x="1524000" y="3506323"/>
+            <a:ext cx="4300728" cy="3179467"/>
           </a:xfrm>
           <a:prstGeom prst="rect">
             <a:avLst/>
@@ -10964,8 +11338,8 @@
         </p:blipFill>
         <p:spPr>
           <a:xfrm>
-            <a:off x="6399085" y="3200400"/>
-            <a:ext cx="4509707" cy="3416117"/>
+            <a:off x="6711492" y="3506324"/>
+            <a:ext cx="4197300" cy="3179468"/>
           </a:xfrm>
           <a:prstGeom prst="rect">
             <a:avLst/>
@@ -11018,14 +11392,9 @@
           <a:lstStyle/>
           <a:p>
             <a:r>
-              <a:rPr lang="en-US" dirty="0" smtClean="0"/>
-              <a:t>Data</a:t>
-            </a:r>
-            <a:r>
-              <a:rPr lang="en-US" dirty="0" smtClean="0"/>
-              <a:t>: Yahoo Finance</a:t>
-            </a:r>
-            <a:endParaRPr lang="en-US" dirty="0"/>
+              <a:rPr lang="en-US" dirty="0"/>
+              <a:t>Data: Yahoo Finance</a:t>
+            </a:r>
           </a:p>
         </p:txBody>
       </p:sp>
@@ -11042,7 +11411,7 @@
         <p:spPr>
           <a:xfrm>
             <a:off x="646111" y="1694689"/>
-            <a:ext cx="9759761" cy="1661160"/>
+            <a:ext cx="9536980" cy="1661160"/>
           </a:xfrm>
         </p:spPr>
         <p:txBody>
@@ -11052,10 +11421,9 @@
           <a:lstStyle/>
           <a:p>
             <a:r>
-              <a:rPr lang="en-US" dirty="0" smtClean="0"/>
+              <a:rPr lang="en-US" dirty="0"/>
               <a:t>Used lognormal distribution and percent returns to describe stock data</a:t>
             </a:r>
-            <a:endParaRPr lang="en-US" dirty="0"/>
           </a:p>
           <a:p>
             <a:pPr lvl="1">
@@ -11069,16 +11437,16 @@
           </a:p>
           <a:p>
             <a:r>
-              <a:rPr lang="en-US" dirty="0" smtClean="0"/>
+              <a:rPr lang="en-US" dirty="0"/>
               <a:t>Below are results for </a:t>
             </a:r>
             <a:r>
-              <a:rPr lang="en-US" b="1" dirty="0" smtClean="0"/>
-              <a:t>Coca-Cola</a:t>
-            </a:r>
-          </a:p>
-          <a:p>
-            <a:endParaRPr lang="en-US" dirty="0" smtClean="0"/>
+              <a:rPr lang="en-US" b="1" dirty="0"/>
+              <a:t>Coca-Cola, 5-day trailing returns, calculated daily</a:t>
+            </a:r>
+          </a:p>
+          <a:p>
+            <a:endParaRPr lang="en-US" dirty="0"/>
           </a:p>
           <a:p>
             <a:endParaRPr lang="en-US" dirty="0"/>
@@ -11101,7 +11469,7 @@
         </p:blipFill>
         <p:spPr>
           <a:xfrm>
-            <a:off x="286321" y="3353151"/>
+            <a:off x="244756" y="3353151"/>
             <a:ext cx="3746183" cy="2853656"/>
           </a:xfrm>
           <a:prstGeom prst="rect">
@@ -11149,7 +11517,7 @@
         </p:blipFill>
         <p:spPr>
           <a:xfrm>
-            <a:off x="7857976" y="3350047"/>
+            <a:off x="7899541" y="3350047"/>
             <a:ext cx="4039715" cy="2859862"/>
           </a:xfrm>
           <a:prstGeom prst="rect">
@@ -11203,14 +11571,9 @@
           <a:lstStyle/>
           <a:p>
             <a:r>
-              <a:rPr lang="en-US" dirty="0" smtClean="0"/>
-              <a:t>Data</a:t>
-            </a:r>
-            <a:r>
-              <a:rPr lang="en-US" dirty="0" smtClean="0"/>
-              <a:t>: Yahoo Finance</a:t>
-            </a:r>
-            <a:endParaRPr lang="en-US" dirty="0"/>
+              <a:rPr lang="en-US" dirty="0"/>
+              <a:t>Data: Yahoo Finance</a:t>
+            </a:r>
           </a:p>
         </p:txBody>
       </p:sp>
@@ -11223,7 +11586,7 @@
           <p:nvPr/>
         </p:nvPicPr>
         <p:blipFill>
-          <a:blip r:embed="rId2"/>
+          <a:blip r:embed="rId3"/>
           <a:stretch>
             <a:fillRect/>
           </a:stretch>
@@ -11259,26 +11622,25 @@
           <a:lstStyle/>
           <a:p>
             <a:r>
-              <a:rPr lang="en-US" dirty="0" smtClean="0"/>
+              <a:rPr lang="en-US" dirty="0"/>
               <a:t>Calculated average returns per week to match Google Trends data</a:t>
             </a:r>
           </a:p>
           <a:p>
             <a:r>
-              <a:rPr lang="en-US" dirty="0" smtClean="0"/>
+              <a:rPr lang="en-US" dirty="0"/>
               <a:t>Created a binary time series for only most substantial losses</a:t>
             </a:r>
           </a:p>
           <a:p>
             <a:r>
-              <a:rPr lang="en-US" u="sng" dirty="0" smtClean="0"/>
+              <a:rPr lang="en-US" u="sng" dirty="0"/>
               <a:t>Ex:</a:t>
             </a:r>
             <a:r>
-              <a:rPr lang="en-US" dirty="0" smtClean="0"/>
+              <a:rPr lang="en-US" dirty="0"/>
               <a:t> 0 0 0 0 1 0 0 0 1 0 0</a:t>
             </a:r>
-            <a:endParaRPr lang="en-US" dirty="0"/>
           </a:p>
         </p:txBody>
       </p:sp>
@@ -11328,10 +11690,9 @@
           <a:lstStyle/>
           <a:p>
             <a:r>
-              <a:rPr lang="en-US" dirty="0" smtClean="0"/>
+              <a:rPr lang="en-US" dirty="0"/>
               <a:t>Manipulate:</a:t>
             </a:r>
-            <a:endParaRPr lang="en-US" dirty="0"/>
           </a:p>
         </p:txBody>
       </p:sp>
@@ -11400,10 +11761,9 @@
           <a:lstStyle/>
           <a:p>
             <a:r>
-              <a:rPr lang="en-US" dirty="0" smtClean="0"/>
+              <a:rPr lang="en-US" dirty="0"/>
               <a:t>Explore: Calculate Correlation</a:t>
             </a:r>
-            <a:endParaRPr lang="en-US" dirty="0"/>
           </a:p>
         </p:txBody>
       </p:sp>
@@ -11428,10 +11788,9 @@
           <a:lstStyle/>
           <a:p>
             <a:r>
-              <a:rPr lang="en-US" dirty="0" smtClean="0"/>
+              <a:rPr lang="en-US" dirty="0"/>
               <a:t>For n-lags, we calculated the correlation between the two time series</a:t>
             </a:r>
-            <a:endParaRPr lang="en-US" dirty="0"/>
           </a:p>
           <a:p>
             <a:endParaRPr lang="en-US" dirty="0"/>

</xml_diff>